<commit_message>
:construction: TDK feedback kerdesekre valasz
</commit_message>
<xml_diff>
--- a/tdk/CzotterBenedek_TDK_javitott_2.0.pptx
+++ b/tdk/CzotterBenedek_TDK_javitott_2.0.pptx
@@ -5,7 +5,7 @@
     <p:sldMasterId id="2147483648" r:id="rId1"/>
   </p:sldMasterIdLst>
   <p:notesMasterIdLst>
-    <p:notesMasterId r:id="rId28"/>
+    <p:notesMasterId r:id="rId36"/>
   </p:notesMasterIdLst>
   <p:sldIdLst>
     <p:sldId id="256" r:id="rId2"/>
@@ -31,9 +31,17 @@
     <p:sldId id="278" r:id="rId22"/>
     <p:sldId id="279" r:id="rId23"/>
     <p:sldId id="282" r:id="rId24"/>
-    <p:sldId id="283" r:id="rId25"/>
-    <p:sldId id="284" r:id="rId26"/>
-    <p:sldId id="260" r:id="rId27"/>
+    <p:sldId id="289" r:id="rId25"/>
+    <p:sldId id="283" r:id="rId26"/>
+    <p:sldId id="290" r:id="rId27"/>
+    <p:sldId id="284" r:id="rId28"/>
+    <p:sldId id="285" r:id="rId29"/>
+    <p:sldId id="291" r:id="rId30"/>
+    <p:sldId id="292" r:id="rId31"/>
+    <p:sldId id="286" r:id="rId32"/>
+    <p:sldId id="287" r:id="rId33"/>
+    <p:sldId id="288" r:id="rId34"/>
+    <p:sldId id="260" r:id="rId35"/>
   </p:sldIdLst>
   <p:sldSz cx="12192000" cy="6858000"/>
   <p:notesSz cx="6858000" cy="9144000"/>
@@ -222,7 +230,7 @@
           <a:p>
             <a:fld id="{0AB5BC8E-5813-4F4E-B35B-0E3B0D0BF7D5}" type="datetimeFigureOut">
               <a:rPr lang="hu-HU" smtClean="0"/>
-              <a:t>2025. 11. 15.</a:t>
+              <a:t>2025. 11. 16.</a:t>
             </a:fld>
             <a:endParaRPr lang="hu-HU"/>
           </a:p>
@@ -3379,100 +3387,6 @@
           <a:bodyPr/>
           <a:lstStyle/>
           <a:p>
-            <a:r>
-              <a:rPr lang="hu-HU" dirty="0" err="1"/>
-              <a:t>All-MiniLM</a:t>
-            </a:r>
-            <a:r>
-              <a:rPr lang="hu-HU" dirty="0"/>
-              <a:t> modell </a:t>
-            </a:r>
-            <a:r>
-              <a:rPr lang="hu-HU" b="0" dirty="0"/>
-              <a:t>páros mondat-reprezentációra lett </a:t>
-            </a:r>
-            <a:r>
-              <a:rPr lang="hu-HU" b="0" dirty="0" err="1"/>
-              <a:t>finomhangolva</a:t>
-            </a:r>
-            <a:r>
-              <a:rPr lang="hu-HU" b="0" dirty="0"/>
-              <a:t> (QA-pár adatokat)</a:t>
-            </a:r>
-          </a:p>
-          <a:p>
-            <a:r>
-              <a:rPr lang="hu-HU" b="0" dirty="0" err="1"/>
-              <a:t>Snowflake</a:t>
-            </a:r>
-            <a:r>
-              <a:rPr lang="hu-HU" b="0" dirty="0"/>
-              <a:t> </a:t>
-            </a:r>
-            <a:r>
-              <a:rPr lang="hu-HU" b="0" dirty="0" err="1"/>
-              <a:t>arctic</a:t>
-            </a:r>
-            <a:r>
-              <a:rPr lang="hu-HU" b="0" dirty="0"/>
-              <a:t> </a:t>
-            </a:r>
-            <a:r>
-              <a:rPr lang="hu-HU" b="0" dirty="0" err="1"/>
-              <a:t>embed</a:t>
-            </a:r>
-            <a:r>
-              <a:rPr lang="hu-HU" b="0" dirty="0"/>
-              <a:t>: univerzális, </a:t>
-            </a:r>
-            <a:r>
-              <a:rPr lang="hu-HU" b="0" dirty="0" err="1"/>
-              <a:t>general</a:t>
-            </a:r>
-            <a:r>
-              <a:rPr lang="hu-HU" b="0" dirty="0"/>
-              <a:t> </a:t>
-            </a:r>
-            <a:r>
-              <a:rPr lang="hu-HU" b="0" dirty="0" err="1"/>
-              <a:t>purpose</a:t>
-            </a:r>
-            <a:r>
-              <a:rPr lang="hu-HU" b="0" dirty="0"/>
-              <a:t> </a:t>
-            </a:r>
-            <a:r>
-              <a:rPr lang="hu-HU" b="0" dirty="0" err="1"/>
-              <a:t>embedder</a:t>
-            </a:r>
-            <a:endParaRPr lang="hu-HU" b="0" dirty="0"/>
-          </a:p>
-          <a:p>
-            <a:endParaRPr lang="hu-HU" dirty="0"/>
-          </a:p>
-          <a:p>
-            <a:r>
-              <a:rPr lang="hu-HU" dirty="0"/>
-              <a:t>Azon volt a lényeg a </a:t>
-            </a:r>
-            <a:r>
-              <a:rPr lang="hu-HU" dirty="0" err="1"/>
-              <a:t>szempontomből</a:t>
-            </a:r>
-            <a:r>
-              <a:rPr lang="hu-HU" dirty="0"/>
-              <a:t>, hogy a dimenziószám legyen más. Nem elsősorban a pontosság növelés volt a cél, a trendek megismerése. Konzisztensen ugyanazokat az </a:t>
-            </a:r>
-            <a:r>
-              <a:rPr lang="hu-HU" dirty="0" err="1"/>
-              <a:t>embeddingeket</a:t>
-            </a:r>
-            <a:r>
-              <a:rPr lang="hu-HU" dirty="0"/>
-              <a:t> használtam, így az eredmények is konzisztensek és általánosíthatóak.</a:t>
-            </a:r>
-          </a:p>
-          <a:p>
             <a:endParaRPr lang="hu-HU" dirty="0"/>
           </a:p>
         </p:txBody>
@@ -3503,7 +3417,7 @@
     </p:spTree>
     <p:extLst>
       <p:ext uri="{BB962C8B-B14F-4D97-AF65-F5344CB8AC3E}">
-        <p14:creationId xmlns:p14="http://schemas.microsoft.com/office/powerpoint/2010/main" val="2953331791"/>
+        <p14:creationId xmlns:p14="http://schemas.microsoft.com/office/powerpoint/2010/main" val="613135619"/>
       </p:ext>
     </p:extLst>
   </p:cSld>
@@ -3557,7 +3471,188 @@
           <a:bodyPr/>
           <a:lstStyle/>
           <a:p>
+            <a:r>
+              <a:rPr lang="hu-HU" dirty="0" err="1"/>
+              <a:t>All-MiniLM</a:t>
+            </a:r>
+            <a:r>
+              <a:rPr lang="hu-HU" dirty="0"/>
+              <a:t> modell </a:t>
+            </a:r>
+            <a:r>
+              <a:rPr lang="hu-HU" b="0" dirty="0"/>
+              <a:t>páros mondat-reprezentációra lett </a:t>
+            </a:r>
+            <a:r>
+              <a:rPr lang="hu-HU" b="0" dirty="0" err="1"/>
+              <a:t>finomhangolva</a:t>
+            </a:r>
+            <a:r>
+              <a:rPr lang="hu-HU" b="0" dirty="0"/>
+              <a:t> (QA-pár adatokat)</a:t>
+            </a:r>
+          </a:p>
+          <a:p>
+            <a:r>
+              <a:rPr lang="hu-HU" b="0" dirty="0" err="1"/>
+              <a:t>Snowflake</a:t>
+            </a:r>
+            <a:r>
+              <a:rPr lang="hu-HU" b="0" dirty="0"/>
+              <a:t> </a:t>
+            </a:r>
+            <a:r>
+              <a:rPr lang="hu-HU" b="0" dirty="0" err="1"/>
+              <a:t>arctic</a:t>
+            </a:r>
+            <a:r>
+              <a:rPr lang="hu-HU" b="0" dirty="0"/>
+              <a:t> </a:t>
+            </a:r>
+            <a:r>
+              <a:rPr lang="hu-HU" b="0" dirty="0" err="1"/>
+              <a:t>embed</a:t>
+            </a:r>
+            <a:r>
+              <a:rPr lang="hu-HU" b="0" dirty="0"/>
+              <a:t>: univerzális, </a:t>
+            </a:r>
+            <a:r>
+              <a:rPr lang="hu-HU" b="0" dirty="0" err="1"/>
+              <a:t>general</a:t>
+            </a:r>
+            <a:r>
+              <a:rPr lang="hu-HU" b="0" dirty="0"/>
+              <a:t> </a:t>
+            </a:r>
+            <a:r>
+              <a:rPr lang="hu-HU" b="0" dirty="0" err="1"/>
+              <a:t>purpose</a:t>
+            </a:r>
+            <a:r>
+              <a:rPr lang="hu-HU" b="0" dirty="0"/>
+              <a:t> </a:t>
+            </a:r>
+            <a:r>
+              <a:rPr lang="hu-HU" b="0" dirty="0" err="1"/>
+              <a:t>embedder</a:t>
+            </a:r>
+            <a:endParaRPr lang="hu-HU" b="0" dirty="0"/>
+          </a:p>
+          <a:p>
+            <a:endParaRPr lang="hu-HU" dirty="0"/>
+          </a:p>
+          <a:p>
+            <a:r>
+              <a:rPr lang="hu-HU" dirty="0"/>
+              <a:t>Azon volt a lényeg a </a:t>
+            </a:r>
+            <a:r>
+              <a:rPr lang="hu-HU" dirty="0" err="1"/>
+              <a:t>szempontomből</a:t>
+            </a:r>
+            <a:r>
+              <a:rPr lang="hu-HU" dirty="0"/>
+              <a:t>, hogy a dimenziószám legyen más. Nem elsősorban a pontosság növelés volt a cél, a trendek megismerése. Konzisztensen ugyanazokat az </a:t>
+            </a:r>
+            <a:r>
+              <a:rPr lang="hu-HU" dirty="0" err="1"/>
+              <a:t>embeddingeket</a:t>
+            </a:r>
+            <a:r>
+              <a:rPr lang="hu-HU" dirty="0"/>
+              <a:t> használtam, így az eredmények is konzisztensek és általánosíthatóak.</a:t>
+            </a:r>
+          </a:p>
+          <a:p>
+            <a:endParaRPr lang="hu-HU" dirty="0"/>
+          </a:p>
+        </p:txBody>
+      </p:sp>
+      <p:sp>
+        <p:nvSpPr>
+          <p:cNvPr id="4" name="Dia számának helye 3"/>
+          <p:cNvSpPr>
+            <a:spLocks noGrp="1"/>
+          </p:cNvSpPr>
+          <p:nvPr>
+            <p:ph type="sldNum" sz="quarter" idx="5"/>
+          </p:nvPr>
+        </p:nvSpPr>
+        <p:spPr/>
+        <p:txBody>
+          <a:bodyPr/>
+          <a:lstStyle/>
+          <a:p>
+            <a:fld id="{FEBF544B-8942-4253-A6F4-42DBF943B8C6}" type="slidenum">
+              <a:rPr lang="hu-HU" smtClean="0"/>
+              <a:t>25</a:t>
+            </a:fld>
             <a:endParaRPr lang="hu-HU"/>
+          </a:p>
+        </p:txBody>
+      </p:sp>
+    </p:spTree>
+    <p:extLst>
+      <p:ext uri="{BB962C8B-B14F-4D97-AF65-F5344CB8AC3E}">
+        <p14:creationId xmlns:p14="http://schemas.microsoft.com/office/powerpoint/2010/main" val="2953331791"/>
+      </p:ext>
+    </p:extLst>
+  </p:cSld>
+  <p:clrMapOvr>
+    <a:masterClrMapping/>
+  </p:clrMapOvr>
+</p:notes>
+</file>
+
+<file path=ppt/notesSlides/notesSlide26.xml><?xml version="1.0" encoding="utf-8"?>
+<p:notes xmlns:a="http://schemas.openxmlformats.org/drawingml/2006/main" xmlns:r="http://schemas.openxmlformats.org/officeDocument/2006/relationships" xmlns:p="http://schemas.openxmlformats.org/presentationml/2006/main">
+  <p:cSld>
+    <p:spTree>
+      <p:nvGrpSpPr>
+        <p:cNvPr id="1" name=""/>
+        <p:cNvGrpSpPr/>
+        <p:nvPr/>
+      </p:nvGrpSpPr>
+      <p:grpSpPr>
+        <a:xfrm>
+          <a:off x="0" y="0"/>
+          <a:ext cx="0" cy="0"/>
+          <a:chOff x="0" y="0"/>
+          <a:chExt cx="0" cy="0"/>
+        </a:xfrm>
+      </p:grpSpPr>
+      <p:sp>
+        <p:nvSpPr>
+          <p:cNvPr id="2" name="Diakép helye 1"/>
+          <p:cNvSpPr>
+            <a:spLocks noGrp="1" noRot="1" noChangeAspect="1"/>
+          </p:cNvSpPr>
+          <p:nvPr>
+            <p:ph type="sldImg"/>
+          </p:nvPr>
+        </p:nvSpPr>
+        <p:spPr/>
+      </p:sp>
+      <p:sp>
+        <p:nvSpPr>
+          <p:cNvPr id="3" name="Jegyzetek helye 2"/>
+          <p:cNvSpPr>
+            <a:spLocks noGrp="1"/>
+          </p:cNvSpPr>
+          <p:nvPr>
+            <p:ph type="body" idx="1"/>
+          </p:nvPr>
+        </p:nvSpPr>
+        <p:spPr/>
+        <p:txBody>
+          <a:bodyPr/>
+          <a:lstStyle/>
+          <a:p>
+            <a:r>
+              <a:rPr lang="hu-HU" dirty="0"/>
+              <a:t>1024 dimenziós vektorokra a kiértékelés</a:t>
+            </a:r>
           </a:p>
         </p:txBody>
       </p:sp>
@@ -3587,7 +3682,467 @@
     </p:spTree>
     <p:extLst>
       <p:ext uri="{BB962C8B-B14F-4D97-AF65-F5344CB8AC3E}">
-        <p14:creationId xmlns:p14="http://schemas.microsoft.com/office/powerpoint/2010/main" val="552155004"/>
+        <p14:creationId xmlns:p14="http://schemas.microsoft.com/office/powerpoint/2010/main" val="2472096673"/>
+      </p:ext>
+    </p:extLst>
+  </p:cSld>
+  <p:clrMapOvr>
+    <a:masterClrMapping/>
+  </p:clrMapOvr>
+</p:notes>
+</file>
+
+<file path=ppt/notesSlides/notesSlide27.xml><?xml version="1.0" encoding="utf-8"?>
+<p:notes xmlns:a="http://schemas.openxmlformats.org/drawingml/2006/main" xmlns:r="http://schemas.openxmlformats.org/officeDocument/2006/relationships" xmlns:p="http://schemas.openxmlformats.org/presentationml/2006/main">
+  <p:cSld>
+    <p:spTree>
+      <p:nvGrpSpPr>
+        <p:cNvPr id="1" name=""/>
+        <p:cNvGrpSpPr/>
+        <p:nvPr/>
+      </p:nvGrpSpPr>
+      <p:grpSpPr>
+        <a:xfrm>
+          <a:off x="0" y="0"/>
+          <a:ext cx="0" cy="0"/>
+          <a:chOff x="0" y="0"/>
+          <a:chExt cx="0" cy="0"/>
+        </a:xfrm>
+      </p:grpSpPr>
+      <p:sp>
+        <p:nvSpPr>
+          <p:cNvPr id="2" name="Diakép helye 1"/>
+          <p:cNvSpPr>
+            <a:spLocks noGrp="1" noRot="1" noChangeAspect="1"/>
+          </p:cNvSpPr>
+          <p:nvPr>
+            <p:ph type="sldImg"/>
+          </p:nvPr>
+        </p:nvSpPr>
+        <p:spPr/>
+      </p:sp>
+      <p:sp>
+        <p:nvSpPr>
+          <p:cNvPr id="3" name="Jegyzetek helye 2"/>
+          <p:cNvSpPr>
+            <a:spLocks noGrp="1"/>
+          </p:cNvSpPr>
+          <p:nvPr>
+            <p:ph type="body" idx="1"/>
+          </p:nvPr>
+        </p:nvSpPr>
+        <p:spPr/>
+        <p:txBody>
+          <a:bodyPr/>
+          <a:lstStyle/>
+          <a:p>
+            <a:r>
+              <a:rPr lang="hu-HU" dirty="0"/>
+              <a:t>IVF: rögzített klaszterszám, nincsenek új klaszterek</a:t>
+            </a:r>
+          </a:p>
+          <a:p>
+            <a:endParaRPr lang="hu-HU" dirty="0"/>
+          </a:p>
+          <a:p>
+            <a:r>
+              <a:rPr lang="hu-HU" dirty="0"/>
+              <a:t>Van egy </a:t>
+            </a:r>
+            <a:r>
+              <a:rPr lang="hu-HU" dirty="0" err="1"/>
+              <a:t>train</a:t>
+            </a:r>
+            <a:r>
+              <a:rPr lang="hu-HU" dirty="0"/>
+              <a:t> fázis ahol elkészülnek a klaszterek és utána az új vektor a legközelebbi klaszterekbe kerül. Nem frissül a </a:t>
+            </a:r>
+            <a:r>
+              <a:rPr lang="hu-HU" dirty="0" err="1"/>
+              <a:t>klaszterezés</a:t>
+            </a:r>
+            <a:r>
+              <a:rPr lang="hu-HU" dirty="0"/>
+              <a:t>.</a:t>
+            </a:r>
+          </a:p>
+          <a:p>
+            <a:r>
+              <a:rPr lang="hu-HU" dirty="0"/>
+              <a:t>Még ha a </a:t>
+            </a:r>
+            <a:r>
+              <a:rPr lang="hu-HU" dirty="0" err="1"/>
+              <a:t>klaszterezés</a:t>
+            </a:r>
+            <a:r>
+              <a:rPr lang="hu-HU" dirty="0"/>
+              <a:t> nagyon gyors is, nehéz ilyen gyorsan meghatározni, mi a helyes új klaszterszám.</a:t>
+            </a:r>
+          </a:p>
+          <a:p>
+            <a:endParaRPr lang="hu-HU" dirty="0"/>
+          </a:p>
+          <a:p>
+            <a:r>
+              <a:rPr lang="hu-HU" dirty="0"/>
+              <a:t>Ha változik az adatok eloszlása időben a </a:t>
+            </a:r>
+            <a:r>
+              <a:rPr lang="hu-HU" dirty="0" err="1"/>
+              <a:t>retrieval</a:t>
+            </a:r>
+            <a:r>
+              <a:rPr lang="hu-HU" dirty="0"/>
+              <a:t> minősége romolhat, ha csak nem lesz elkészítve a </a:t>
+            </a:r>
+            <a:r>
+              <a:rPr lang="hu-HU" dirty="0" err="1"/>
+              <a:t>klaszterezés</a:t>
+            </a:r>
+            <a:r>
+              <a:rPr lang="hu-HU" dirty="0"/>
+              <a:t> újra, új klaszterszámmal.</a:t>
+            </a:r>
+          </a:p>
+          <a:p>
+            <a:r>
+              <a:rPr lang="hu-HU" b="1" dirty="0"/>
+              <a:t>HNSW </a:t>
+            </a:r>
+            <a:r>
+              <a:rPr lang="hu-HU" b="1" dirty="0" err="1"/>
+              <a:t>can</a:t>
+            </a:r>
+            <a:r>
+              <a:rPr lang="hu-HU" b="1" dirty="0"/>
+              <a:t> </a:t>
+            </a:r>
+            <a:r>
+              <a:rPr lang="hu-HU" b="1" dirty="0" err="1"/>
+              <a:t>reorganize</a:t>
+            </a:r>
+            <a:r>
+              <a:rPr lang="hu-HU" b="1" dirty="0"/>
+              <a:t> </a:t>
+            </a:r>
+            <a:r>
+              <a:rPr lang="hu-HU" b="1" dirty="0" err="1"/>
+              <a:t>itself</a:t>
+            </a:r>
+            <a:r>
+              <a:rPr lang="hu-HU" b="1" dirty="0"/>
+              <a:t>, </a:t>
+            </a:r>
+            <a:r>
+              <a:rPr lang="hu-HU" b="0" dirty="0"/>
+              <a:t>ez volt a releváns módszer a szempontomból, amihez hasonlítani kellett.</a:t>
+            </a:r>
+          </a:p>
+          <a:p>
+            <a:endParaRPr lang="hu-HU" b="0" dirty="0"/>
+          </a:p>
+          <a:p>
+            <a:r>
+              <a:rPr lang="hu-HU" b="0" dirty="0"/>
+              <a:t>Jövőben </a:t>
+            </a:r>
+            <a:r>
+              <a:rPr lang="hu-HU" b="0" dirty="0" err="1"/>
+              <a:t>OnlineKMeans</a:t>
+            </a:r>
+            <a:r>
+              <a:rPr lang="hu-HU" b="0" dirty="0"/>
+              <a:t> + FAISS összevonása</a:t>
+            </a:r>
+            <a:endParaRPr lang="hu-HU" b="1" dirty="0"/>
+          </a:p>
+        </p:txBody>
+      </p:sp>
+      <p:sp>
+        <p:nvSpPr>
+          <p:cNvPr id="4" name="Dia számának helye 3"/>
+          <p:cNvSpPr>
+            <a:spLocks noGrp="1"/>
+          </p:cNvSpPr>
+          <p:nvPr>
+            <p:ph type="sldNum" sz="quarter" idx="5"/>
+          </p:nvPr>
+        </p:nvSpPr>
+        <p:spPr/>
+        <p:txBody>
+          <a:bodyPr/>
+          <a:lstStyle/>
+          <a:p>
+            <a:fld id="{FEBF544B-8942-4253-A6F4-42DBF943B8C6}" type="slidenum">
+              <a:rPr lang="hu-HU" smtClean="0"/>
+              <a:t>28</a:t>
+            </a:fld>
+            <a:endParaRPr lang="hu-HU"/>
+          </a:p>
+        </p:txBody>
+      </p:sp>
+    </p:spTree>
+    <p:extLst>
+      <p:ext uri="{BB962C8B-B14F-4D97-AF65-F5344CB8AC3E}">
+        <p14:creationId xmlns:p14="http://schemas.microsoft.com/office/powerpoint/2010/main" val="3312740467"/>
+      </p:ext>
+    </p:extLst>
+  </p:cSld>
+  <p:clrMapOvr>
+    <a:masterClrMapping/>
+  </p:clrMapOvr>
+</p:notes>
+</file>
+
+<file path=ppt/notesSlides/notesSlide28.xml><?xml version="1.0" encoding="utf-8"?>
+<p:notes xmlns:a="http://schemas.openxmlformats.org/drawingml/2006/main" xmlns:r="http://schemas.openxmlformats.org/officeDocument/2006/relationships" xmlns:p="http://schemas.openxmlformats.org/presentationml/2006/main">
+  <p:cSld>
+    <p:spTree>
+      <p:nvGrpSpPr>
+        <p:cNvPr id="1" name=""/>
+        <p:cNvGrpSpPr/>
+        <p:nvPr/>
+      </p:nvGrpSpPr>
+      <p:grpSpPr>
+        <a:xfrm>
+          <a:off x="0" y="0"/>
+          <a:ext cx="0" cy="0"/>
+          <a:chOff x="0" y="0"/>
+          <a:chExt cx="0" cy="0"/>
+        </a:xfrm>
+      </p:grpSpPr>
+      <p:sp>
+        <p:nvSpPr>
+          <p:cNvPr id="2" name="Diakép helye 1"/>
+          <p:cNvSpPr>
+            <a:spLocks noGrp="1" noRot="1" noChangeAspect="1"/>
+          </p:cNvSpPr>
+          <p:nvPr>
+            <p:ph type="sldImg"/>
+          </p:nvPr>
+        </p:nvSpPr>
+        <p:spPr/>
+      </p:sp>
+      <p:sp>
+        <p:nvSpPr>
+          <p:cNvPr id="3" name="Jegyzetek helye 2"/>
+          <p:cNvSpPr>
+            <a:spLocks noGrp="1"/>
+          </p:cNvSpPr>
+          <p:nvPr>
+            <p:ph type="body" idx="1"/>
+          </p:nvPr>
+        </p:nvSpPr>
+        <p:spPr/>
+        <p:txBody>
+          <a:bodyPr/>
+          <a:lstStyle/>
+          <a:p>
+            <a:r>
+              <a:rPr lang="hu-HU" dirty="0"/>
+              <a:t>Ezeknek az értékeknek a megválasztása a </a:t>
+            </a:r>
+            <a:r>
+              <a:rPr lang="hu-HU" dirty="0" err="1"/>
+              <a:t>klaszterezés</a:t>
+            </a:r>
+            <a:r>
+              <a:rPr lang="hu-HU" dirty="0"/>
+              <a:t> eredményeinek szempontjából kritikus, mint </a:t>
+            </a:r>
+            <a:r>
+              <a:rPr lang="hu-HU" dirty="0" err="1"/>
+              <a:t>pl</a:t>
+            </a:r>
+            <a:r>
+              <a:rPr lang="hu-HU" dirty="0"/>
+              <a:t> DBSCAN esetén epszilon.</a:t>
+            </a:r>
+          </a:p>
+        </p:txBody>
+      </p:sp>
+      <p:sp>
+        <p:nvSpPr>
+          <p:cNvPr id="4" name="Dia számának helye 3"/>
+          <p:cNvSpPr>
+            <a:spLocks noGrp="1"/>
+          </p:cNvSpPr>
+          <p:nvPr>
+            <p:ph type="sldNum" sz="quarter" idx="5"/>
+          </p:nvPr>
+        </p:nvSpPr>
+        <p:spPr/>
+        <p:txBody>
+          <a:bodyPr/>
+          <a:lstStyle/>
+          <a:p>
+            <a:fld id="{FEBF544B-8942-4253-A6F4-42DBF943B8C6}" type="slidenum">
+              <a:rPr lang="hu-HU" smtClean="0"/>
+              <a:t>31</a:t>
+            </a:fld>
+            <a:endParaRPr lang="hu-HU"/>
+          </a:p>
+        </p:txBody>
+      </p:sp>
+    </p:spTree>
+    <p:extLst>
+      <p:ext uri="{BB962C8B-B14F-4D97-AF65-F5344CB8AC3E}">
+        <p14:creationId xmlns:p14="http://schemas.microsoft.com/office/powerpoint/2010/main" val="3128718055"/>
+      </p:ext>
+    </p:extLst>
+  </p:cSld>
+  <p:clrMapOvr>
+    <a:masterClrMapping/>
+  </p:clrMapOvr>
+</p:notes>
+</file>
+
+<file path=ppt/notesSlides/notesSlide29.xml><?xml version="1.0" encoding="utf-8"?>
+<p:notes xmlns:a="http://schemas.openxmlformats.org/drawingml/2006/main" xmlns:r="http://schemas.openxmlformats.org/officeDocument/2006/relationships" xmlns:p="http://schemas.openxmlformats.org/presentationml/2006/main">
+  <p:cSld>
+    <p:spTree>
+      <p:nvGrpSpPr>
+        <p:cNvPr id="1" name=""/>
+        <p:cNvGrpSpPr/>
+        <p:nvPr/>
+      </p:nvGrpSpPr>
+      <p:grpSpPr>
+        <a:xfrm>
+          <a:off x="0" y="0"/>
+          <a:ext cx="0" cy="0"/>
+          <a:chOff x="0" y="0"/>
+          <a:chExt cx="0" cy="0"/>
+        </a:xfrm>
+      </p:grpSpPr>
+      <p:sp>
+        <p:nvSpPr>
+          <p:cNvPr id="2" name="Diakép helye 1"/>
+          <p:cNvSpPr>
+            <a:spLocks noGrp="1" noRot="1" noChangeAspect="1"/>
+          </p:cNvSpPr>
+          <p:nvPr>
+            <p:ph type="sldImg"/>
+          </p:nvPr>
+        </p:nvSpPr>
+        <p:spPr/>
+      </p:sp>
+      <p:sp>
+        <p:nvSpPr>
+          <p:cNvPr id="3" name="Jegyzetek helye 2"/>
+          <p:cNvSpPr>
+            <a:spLocks noGrp="1"/>
+          </p:cNvSpPr>
+          <p:nvPr>
+            <p:ph type="body" idx="1"/>
+          </p:nvPr>
+        </p:nvSpPr>
+        <p:spPr/>
+        <p:txBody>
+          <a:bodyPr/>
+          <a:lstStyle/>
+          <a:p>
+            <a:pPr marL="228600" indent="-228600">
+              <a:buAutoNum type="arabicPeriod"/>
+            </a:pPr>
+            <a:r>
+              <a:rPr lang="hu-HU" dirty="0"/>
+              <a:t>normalizálás, mátrixszorzás</a:t>
+            </a:r>
+          </a:p>
+          <a:p>
+            <a:pPr marL="228600" indent="-228600">
+              <a:buAutoNum type="arabicPeriod"/>
+            </a:pPr>
+            <a:r>
+              <a:rPr lang="hu-HU" dirty="0"/>
+              <a:t>Min távolság kiválasztása</a:t>
+            </a:r>
+          </a:p>
+          <a:p>
+            <a:pPr marL="228600" indent="-228600">
+              <a:buAutoNum type="arabicPeriod"/>
+            </a:pPr>
+            <a:r>
+              <a:rPr lang="hu-HU" dirty="0"/>
+              <a:t>Maximum (</a:t>
+            </a:r>
+            <a:r>
+              <a:rPr lang="hu-HU" dirty="0" err="1"/>
+              <a:t>max_clusters</a:t>
+            </a:r>
+            <a:r>
+              <a:rPr lang="hu-HU" dirty="0"/>
+              <a:t> - </a:t>
+            </a:r>
+            <a:r>
+              <a:rPr lang="hu-HU" dirty="0" err="1"/>
+              <a:t>k</a:t>
+            </a:r>
+            <a:r>
+              <a:rPr lang="hu-HU" dirty="0"/>
+              <a:t>) új jöhet létre</a:t>
+            </a:r>
+          </a:p>
+          <a:p>
+            <a:pPr marL="228600" indent="-228600">
+              <a:buAutoNum type="arabicPeriod"/>
+            </a:pPr>
+            <a:r>
+              <a:rPr lang="hu-HU" dirty="0" err="1"/>
+              <a:t>Centroid</a:t>
+            </a:r>
+            <a:r>
+              <a:rPr lang="hu-HU" dirty="0"/>
+              <a:t> frissítés: minden pontot egyszer összeadunk</a:t>
+            </a:r>
+          </a:p>
+          <a:p>
+            <a:pPr marL="228600" indent="-228600">
+              <a:buAutoNum type="arabicPeriod"/>
+            </a:pPr>
+            <a:r>
+              <a:rPr lang="hu-HU" dirty="0"/>
+              <a:t>Klaszterek közötti </a:t>
+            </a:r>
+            <a:r>
+              <a:rPr lang="hu-HU" dirty="0" err="1"/>
+              <a:t>páronkénti</a:t>
+            </a:r>
+            <a:r>
+              <a:rPr lang="hu-HU" dirty="0"/>
+              <a:t> távolság számítása</a:t>
+            </a:r>
+          </a:p>
+        </p:txBody>
+      </p:sp>
+      <p:sp>
+        <p:nvSpPr>
+          <p:cNvPr id="4" name="Dia számának helye 3"/>
+          <p:cNvSpPr>
+            <a:spLocks noGrp="1"/>
+          </p:cNvSpPr>
+          <p:nvPr>
+            <p:ph type="sldNum" sz="quarter" idx="5"/>
+          </p:nvPr>
+        </p:nvSpPr>
+        <p:spPr/>
+        <p:txBody>
+          <a:bodyPr/>
+          <a:lstStyle/>
+          <a:p>
+            <a:fld id="{FEBF544B-8942-4253-A6F4-42DBF943B8C6}" type="slidenum">
+              <a:rPr lang="hu-HU" smtClean="0"/>
+              <a:t>32</a:t>
+            </a:fld>
+            <a:endParaRPr lang="hu-HU"/>
+          </a:p>
+        </p:txBody>
+      </p:sp>
+    </p:spTree>
+    <p:extLst>
+      <p:ext uri="{BB962C8B-B14F-4D97-AF65-F5344CB8AC3E}">
+        <p14:creationId xmlns:p14="http://schemas.microsoft.com/office/powerpoint/2010/main" val="1399101224"/>
       </p:ext>
     </p:extLst>
   </p:cSld>
@@ -3694,6 +4249,90 @@
     <p:extLst>
       <p:ext uri="{BB962C8B-B14F-4D97-AF65-F5344CB8AC3E}">
         <p14:creationId xmlns:p14="http://schemas.microsoft.com/office/powerpoint/2010/main" val="876145201"/>
+      </p:ext>
+    </p:extLst>
+  </p:cSld>
+  <p:clrMapOvr>
+    <a:masterClrMapping/>
+  </p:clrMapOvr>
+</p:notes>
+</file>
+
+<file path=ppt/notesSlides/notesSlide30.xml><?xml version="1.0" encoding="utf-8"?>
+<p:notes xmlns:a="http://schemas.openxmlformats.org/drawingml/2006/main" xmlns:r="http://schemas.openxmlformats.org/officeDocument/2006/relationships" xmlns:p="http://schemas.openxmlformats.org/presentationml/2006/main">
+  <p:cSld>
+    <p:spTree>
+      <p:nvGrpSpPr>
+        <p:cNvPr id="1" name=""/>
+        <p:cNvGrpSpPr/>
+        <p:nvPr/>
+      </p:nvGrpSpPr>
+      <p:grpSpPr>
+        <a:xfrm>
+          <a:off x="0" y="0"/>
+          <a:ext cx="0" cy="0"/>
+          <a:chOff x="0" y="0"/>
+          <a:chExt cx="0" cy="0"/>
+        </a:xfrm>
+      </p:grpSpPr>
+      <p:sp>
+        <p:nvSpPr>
+          <p:cNvPr id="2" name="Diakép helye 1"/>
+          <p:cNvSpPr>
+            <a:spLocks noGrp="1" noRot="1" noChangeAspect="1"/>
+          </p:cNvSpPr>
+          <p:nvPr>
+            <p:ph type="sldImg"/>
+          </p:nvPr>
+        </p:nvSpPr>
+        <p:spPr/>
+      </p:sp>
+      <p:sp>
+        <p:nvSpPr>
+          <p:cNvPr id="3" name="Jegyzetek helye 2"/>
+          <p:cNvSpPr>
+            <a:spLocks noGrp="1"/>
+          </p:cNvSpPr>
+          <p:nvPr>
+            <p:ph type="body" idx="1"/>
+          </p:nvPr>
+        </p:nvSpPr>
+        <p:spPr/>
+        <p:txBody>
+          <a:bodyPr/>
+          <a:lstStyle/>
+          <a:p>
+            <a:endParaRPr lang="hu-HU"/>
+          </a:p>
+        </p:txBody>
+      </p:sp>
+      <p:sp>
+        <p:nvSpPr>
+          <p:cNvPr id="4" name="Dia számának helye 3"/>
+          <p:cNvSpPr>
+            <a:spLocks noGrp="1"/>
+          </p:cNvSpPr>
+          <p:nvPr>
+            <p:ph type="sldNum" sz="quarter" idx="5"/>
+          </p:nvPr>
+        </p:nvSpPr>
+        <p:spPr/>
+        <p:txBody>
+          <a:bodyPr/>
+          <a:lstStyle/>
+          <a:p>
+            <a:fld id="{FEBF544B-8942-4253-A6F4-42DBF943B8C6}" type="slidenum">
+              <a:rPr lang="hu-HU" smtClean="0"/>
+              <a:t>34</a:t>
+            </a:fld>
+            <a:endParaRPr lang="hu-HU"/>
+          </a:p>
+        </p:txBody>
+      </p:sp>
+    </p:spTree>
+    <p:extLst>
+      <p:ext uri="{BB962C8B-B14F-4D97-AF65-F5344CB8AC3E}">
+        <p14:creationId xmlns:p14="http://schemas.microsoft.com/office/powerpoint/2010/main" val="552155004"/>
       </p:ext>
     </p:extLst>
   </p:cSld>
@@ -4874,7 +5513,7 @@
           <a:p>
             <a:fld id="{D45F21B2-F76C-DA4E-93C7-1ED776993694}" type="datetime1">
               <a:rPr lang="hu-HU" smtClean="0"/>
-              <a:t>2025. 11. 15.</a:t>
+              <a:t>2025. 11. 16.</a:t>
             </a:fld>
             <a:endParaRPr lang="hu-HU"/>
           </a:p>
@@ -5075,7 +5714,7 @@
           <a:p>
             <a:fld id="{639F617D-633B-144B-B338-1A3186D94DEC}" type="datetime1">
               <a:rPr lang="hu-HU" smtClean="0"/>
-              <a:t>2025. 11. 15.</a:t>
+              <a:t>2025. 11. 16.</a:t>
             </a:fld>
             <a:endParaRPr lang="hu-HU"/>
           </a:p>
@@ -5283,7 +5922,7 @@
           <a:p>
             <a:fld id="{EB40C74A-E794-5D4C-99F0-E0908F250C85}" type="datetime1">
               <a:rPr lang="hu-HU" smtClean="0"/>
-              <a:t>2025. 11. 15.</a:t>
+              <a:t>2025. 11. 16.</a:t>
             </a:fld>
             <a:endParaRPr lang="hu-HU"/>
           </a:p>
@@ -5481,7 +6120,7 @@
           <a:p>
             <a:fld id="{FB2979DB-241A-8544-95D6-5A5515E861C2}" type="datetime1">
               <a:rPr lang="hu-HU" smtClean="0"/>
-              <a:t>2025. 11. 15.</a:t>
+              <a:t>2025. 11. 16.</a:t>
             </a:fld>
             <a:endParaRPr lang="hu-HU"/>
           </a:p>
@@ -5756,7 +6395,7 @@
           <a:p>
             <a:fld id="{E1238A03-143C-DC48-B6FB-03520BF3D264}" type="datetime1">
               <a:rPr lang="hu-HU" smtClean="0"/>
-              <a:t>2025. 11. 15.</a:t>
+              <a:t>2025. 11. 16.</a:t>
             </a:fld>
             <a:endParaRPr lang="hu-HU"/>
           </a:p>
@@ -6021,7 +6660,7 @@
           <a:p>
             <a:fld id="{32D5DABD-02F3-C24D-B459-BA5A52C7C0D3}" type="datetime1">
               <a:rPr lang="hu-HU" smtClean="0"/>
-              <a:t>2025. 11. 15.</a:t>
+              <a:t>2025. 11. 16.</a:t>
             </a:fld>
             <a:endParaRPr lang="hu-HU"/>
           </a:p>
@@ -6433,7 +7072,7 @@
           <a:p>
             <a:fld id="{B8F665F1-11A6-C146-8C9C-4EAD2B21F502}" type="datetime1">
               <a:rPr lang="hu-HU" smtClean="0"/>
-              <a:t>2025. 11. 15.</a:t>
+              <a:t>2025. 11. 16.</a:t>
             </a:fld>
             <a:endParaRPr lang="hu-HU"/>
           </a:p>
@@ -6574,7 +7213,7 @@
           <a:p>
             <a:fld id="{0505F671-323E-D34A-8D4F-5155E3541BC7}" type="datetime1">
               <a:rPr lang="hu-HU" smtClean="0"/>
-              <a:t>2025. 11. 15.</a:t>
+              <a:t>2025. 11. 16.</a:t>
             </a:fld>
             <a:endParaRPr lang="hu-HU"/>
           </a:p>
@@ -6687,7 +7326,7 @@
           <a:p>
             <a:fld id="{B3CDB417-D9D9-C740-B221-44D378005732}" type="datetime1">
               <a:rPr lang="hu-HU" smtClean="0"/>
-              <a:t>2025. 11. 15.</a:t>
+              <a:t>2025. 11. 16.</a:t>
             </a:fld>
             <a:endParaRPr lang="hu-HU"/>
           </a:p>
@@ -6998,7 +7637,7 @@
           <a:p>
             <a:fld id="{3980F3EA-3925-E241-9F9A-1E3EF43D2F81}" type="datetime1">
               <a:rPr lang="hu-HU" smtClean="0"/>
-              <a:t>2025. 11. 15.</a:t>
+              <a:t>2025. 11. 16.</a:t>
             </a:fld>
             <a:endParaRPr lang="hu-HU"/>
           </a:p>
@@ -7286,7 +7925,7 @@
           <a:p>
             <a:fld id="{662B74F7-95E0-1C4A-BBFA-D3DEF04605D4}" type="datetime1">
               <a:rPr lang="hu-HU" smtClean="0"/>
-              <a:t>2025. 11. 15.</a:t>
+              <a:t>2025. 11. 16.</a:t>
             </a:fld>
             <a:endParaRPr lang="hu-HU"/>
           </a:p>
@@ -7527,7 +8166,7 @@
           <a:p>
             <a:fld id="{E04DB062-3C69-2A49-980E-3FE962CDF110}" type="datetime1">
               <a:rPr lang="hu-HU" smtClean="0"/>
-              <a:t>2025. 11. 15.</a:t>
+              <a:t>2025. 11. 16.</a:t>
             </a:fld>
             <a:endParaRPr lang="hu-HU" dirty="0"/>
           </a:p>
@@ -8466,7 +9105,7 @@
           <a:p>
             <a:fld id="{78DF9215-F87C-794D-9DB3-DA814D7D6B51}" type="datetime1">
               <a:rPr lang="hu-HU" smtClean="0"/>
-              <a:t>2025. 11. 15.</a:t>
+              <a:t>2025. 11. 16.</a:t>
             </a:fld>
             <a:endParaRPr lang="hu-HU"/>
           </a:p>
@@ -8504,59 +9143,39 @@
           </a:p>
         </p:txBody>
       </p:sp>
-      <p:sp>
-        <p:nvSpPr>
-          <p:cNvPr id="8" name="Tartalom helye 7">
-            <a:extLst>
-              <a:ext uri="{FF2B5EF4-FFF2-40B4-BE49-F238E27FC236}">
-                <a16:creationId xmlns:a16="http://schemas.microsoft.com/office/drawing/2014/main" id="{3C25C462-0493-14FC-7AFB-DF71D4745B53}"/>
-              </a:ext>
-            </a:extLst>
-          </p:cNvPr>
-          <p:cNvSpPr>
-            <a:spLocks noGrp="1"/>
-          </p:cNvSpPr>
-          <p:nvPr>
-            <p:ph idx="1"/>
-          </p:nvPr>
-        </p:nvSpPr>
-        <p:spPr/>
-        <p:txBody>
-          <a:bodyPr/>
-          <a:lstStyle/>
-          <a:p>
-            <a:endParaRPr lang="hu-HU"/>
-          </a:p>
-        </p:txBody>
-      </p:sp>
       <p:pic>
         <p:nvPicPr>
-          <p:cNvPr id="9" name="Kép 8">
-            <a:extLst>
-              <a:ext uri="{FF2B5EF4-FFF2-40B4-BE49-F238E27FC236}">
-                <a16:creationId xmlns:a16="http://schemas.microsoft.com/office/drawing/2014/main" id="{D6A99B93-22A6-9F32-8B40-D36FE50F547D}"/>
+          <p:cNvPr id="7" name="Tartalom helye 6" descr="A képen szöveg, Betűtípus, képernyőkép, dokumentum látható&#10;&#10;Automatikusan generált leírás">
+            <a:extLst>
+              <a:ext uri="{FF2B5EF4-FFF2-40B4-BE49-F238E27FC236}">
+                <a16:creationId xmlns:a16="http://schemas.microsoft.com/office/drawing/2014/main" id="{25FE4AF1-0ABC-ACC1-2CEA-3001B7A55E80}"/>
               </a:ext>
             </a:extLst>
           </p:cNvPr>
           <p:cNvPicPr>
-            <a:picLocks noChangeAspect="1"/>
+            <a:picLocks noGrp="1" noChangeAspect="1"/>
           </p:cNvPicPr>
-          <p:nvPr/>
+          <p:nvPr>
+            <p:ph idx="1"/>
+          </p:nvPr>
         </p:nvPicPr>
         <p:blipFill>
-          <a:blip r:embed="rId3"/>
+          <a:blip r:embed="rId3">
+            <a:extLst>
+              <a:ext uri="{28A0092B-C50C-407E-A947-70E740481C1C}">
+                <a14:useLocalDpi xmlns:a14="http://schemas.microsoft.com/office/drawing/2010/main" val="0"/>
+              </a:ext>
+            </a:extLst>
+          </a:blip>
           <a:stretch>
             <a:fillRect/>
           </a:stretch>
         </p:blipFill>
         <p:spPr>
           <a:xfrm>
-            <a:off x="667295" y="1659144"/>
-            <a:ext cx="10857410" cy="4684299"/>
+            <a:off x="838200" y="1690688"/>
+            <a:ext cx="10515600" cy="4607704"/>
           </a:xfrm>
-          <a:prstGeom prst="rect">
-            <a:avLst/>
-          </a:prstGeom>
         </p:spPr>
       </p:pic>
       <p:pic>
@@ -8769,7 +9388,7 @@
           <a:p>
             <a:fld id="{16CFAA20-991C-5440-821D-EF7936105166}" type="datetime1">
               <a:rPr lang="hu-HU" smtClean="0"/>
-              <a:t>2025. 11. 15.</a:t>
+              <a:t>2025. 11. 16.</a:t>
             </a:fld>
             <a:endParaRPr lang="hu-HU"/>
           </a:p>
@@ -8931,7 +9550,7 @@
           <a:p>
             <a:fld id="{031D0D19-1B35-7A4F-93B5-1EDA6F972E33}" type="datetime1">
               <a:rPr lang="hu-HU" smtClean="0"/>
-              <a:t>2025. 11. 15.</a:t>
+              <a:t>2025. 11. 16.</a:t>
             </a:fld>
             <a:endParaRPr lang="hu-HU"/>
           </a:p>
@@ -9306,7 +9925,7 @@
           <a:p>
             <a:fld id="{F5CF19C3-C554-0D49-858F-BC5A4F8BAF23}" type="datetime1">
               <a:rPr lang="hu-HU" smtClean="0"/>
-              <a:t>2025. 11. 15.</a:t>
+              <a:t>2025. 11. 16.</a:t>
             </a:fld>
             <a:endParaRPr lang="hu-HU"/>
           </a:p>
@@ -9462,7 +10081,7 @@
           <a:p>
             <a:fld id="{86D7C4ED-070D-D147-BEC5-7EAE588D72B2}" type="datetime1">
               <a:rPr lang="hu-HU" smtClean="0"/>
-              <a:t>2025. 11. 15.</a:t>
+              <a:t>2025. 11. 16.</a:t>
             </a:fld>
             <a:endParaRPr lang="hu-HU"/>
           </a:p>
@@ -9704,7 +10323,7 @@
           <a:p>
             <a:fld id="{DB103250-059E-6C49-9AEC-D7E11F74EA17}" type="datetime1">
               <a:rPr lang="hu-HU" smtClean="0"/>
-              <a:t>2025. 11. 15.</a:t>
+              <a:t>2025. 11. 16.</a:t>
             </a:fld>
             <a:endParaRPr lang="hu-HU"/>
           </a:p>
@@ -9913,7 +10532,7 @@
           <a:p>
             <a:fld id="{CA3B4C4B-4FCE-684E-BDCF-894303FF802E}" type="datetime1">
               <a:rPr lang="hu-HU" smtClean="0"/>
-              <a:t>2025. 11. 15.</a:t>
+              <a:t>2025. 11. 16.</a:t>
             </a:fld>
             <a:endParaRPr lang="hu-HU"/>
           </a:p>
@@ -10234,7 +10853,7 @@
           <a:p>
             <a:fld id="{A1F67968-9289-324A-8185-9F1024D0E0BB}" type="datetime1">
               <a:rPr lang="hu-HU" smtClean="0"/>
-              <a:t>2025. 11. 15.</a:t>
+              <a:t>2025. 11. 16.</a:t>
             </a:fld>
             <a:endParaRPr lang="hu-HU"/>
           </a:p>
@@ -10355,7 +10974,7 @@
           <a:p>
             <a:fld id="{C19EC71B-C64D-AC47-B57B-94F3463CBF7C}" type="datetime1">
               <a:rPr lang="hu-HU" smtClean="0"/>
-              <a:t>2025. 11. 15.</a:t>
+              <a:t>2025. 11. 16.</a:t>
             </a:fld>
             <a:endParaRPr lang="hu-HU"/>
           </a:p>
@@ -10685,7 +11304,7 @@
           <a:p>
             <a:fld id="{9B9C5130-88B4-B04A-A570-CDDCA513217F}" type="datetime1">
               <a:rPr lang="hu-HU" smtClean="0"/>
-              <a:t>2025. 11. 15.</a:t>
+              <a:t>2025. 11. 16.</a:t>
             </a:fld>
             <a:endParaRPr lang="hu-HU"/>
           </a:p>
@@ -11341,7 +11960,7 @@
           <a:p>
             <a:fld id="{D3B9E4F3-2471-F946-A10E-F965F7F15FF3}" type="datetime1">
               <a:rPr lang="hu-HU" smtClean="0"/>
-              <a:t>2025. 11. 15.</a:t>
+              <a:t>2025. 11. 16.</a:t>
             </a:fld>
             <a:endParaRPr lang="hu-HU"/>
           </a:p>
@@ -11532,7 +12151,7 @@
           <a:p>
             <a:fld id="{C6ADFBD6-396A-C74B-847F-F81995866E7F}" type="datetime1">
               <a:rPr lang="hu-HU" smtClean="0"/>
-              <a:t>2025. 11. 15.</a:t>
+              <a:t>2025. 11. 16.</a:t>
             </a:fld>
             <a:endParaRPr lang="hu-HU"/>
           </a:p>
@@ -12590,7 +13209,7 @@
             </a:pPr>
             <a:fld id="{29D8A9DB-A63D-1E43-964A-FEA6F241DBC6}" type="datetime1">
               <a:rPr lang="hu-HU" smtClean="0"/>
-              <a:t>2025. 11. 15.</a:t>
+              <a:t>2025. 11. 16.</a:t>
             </a:fld>
             <a:endParaRPr lang="hu-HU"/>
           </a:p>
@@ -13306,7 +13925,7 @@
           <a:p>
             <a:r>
               <a:rPr lang="hu-HU" dirty="0"/>
-              <a:t>Kérdés 1/3</a:t>
+              <a:t>Kérdés 1/6</a:t>
             </a:r>
           </a:p>
         </p:txBody>
@@ -13347,6 +13966,15 @@
             <a:r>
               <a:rPr lang="hu-HU" dirty="0"/>
               <a:t>Válasz:</a:t>
+            </a:r>
+          </a:p>
+          <a:p>
+            <a:pPr marL="0" indent="0">
+              <a:buNone/>
+            </a:pPr>
+            <a:r>
+              <a:rPr lang="hu-HU" dirty="0"/>
+              <a:t>Főleg a hasonlósági küszöbérték megválasztásától függ a pontossági eredmény. A hiányzó dokumentumok aránya nem befolyásoló tényező.</a:t>
             </a:r>
           </a:p>
         </p:txBody>
@@ -13436,7 +14064,7 @@
           <p:cNvPr id="2" name="Cím 1">
             <a:extLst>
               <a:ext uri="{FF2B5EF4-FFF2-40B4-BE49-F238E27FC236}">
-                <a16:creationId xmlns:a16="http://schemas.microsoft.com/office/drawing/2014/main" id="{A5C2D948-E810-3B60-6951-A5D022A784E3}"/>
+                <a16:creationId xmlns:a16="http://schemas.microsoft.com/office/drawing/2014/main" id="{AE91160E-3CFC-51F4-0D64-B37431A455A8}"/>
               </a:ext>
             </a:extLst>
           </p:cNvPr>
@@ -13453,150 +14081,211 @@
           <a:lstStyle/>
           <a:p>
             <a:r>
-              <a:rPr lang="hu-HU" dirty="0"/>
-              <a:t>Kérdés 2/3</a:t>
-            </a:r>
-            <a:br>
-              <a:rPr lang="hu-HU" dirty="0"/>
-            </a:br>
+              <a:rPr lang="hu-HU"/>
+              <a:t>Kérdés 1/6</a:t>
+            </a:r>
             <a:endParaRPr lang="hu-HU" dirty="0"/>
           </a:p>
         </p:txBody>
       </p:sp>
       <p:sp>
         <p:nvSpPr>
-          <p:cNvPr id="3" name="Tartalom helye 2">
-            <a:extLst>
-              <a:ext uri="{FF2B5EF4-FFF2-40B4-BE49-F238E27FC236}">
-                <a16:creationId xmlns:a16="http://schemas.microsoft.com/office/drawing/2014/main" id="{7F04CF62-587D-AB1F-2779-C1194997BECE}"/>
-              </a:ext>
-            </a:extLst>
-          </p:cNvPr>
-          <p:cNvSpPr>
-            <a:spLocks noGrp="1"/>
-          </p:cNvSpPr>
+          <p:cNvPr id="4" name="Dátum helye 3">
+            <a:extLst>
+              <a:ext uri="{FF2B5EF4-FFF2-40B4-BE49-F238E27FC236}">
+                <a16:creationId xmlns:a16="http://schemas.microsoft.com/office/drawing/2014/main" id="{F0895B76-EC99-4CD9-78E8-9824BC16C3A3}"/>
+              </a:ext>
+            </a:extLst>
+          </p:cNvPr>
+          <p:cNvSpPr>
+            <a:spLocks noGrp="1"/>
+          </p:cNvSpPr>
+          <p:nvPr>
+            <p:ph type="dt" sz="half" idx="10"/>
+          </p:nvPr>
+        </p:nvSpPr>
+        <p:spPr/>
+        <p:txBody>
+          <a:bodyPr/>
+          <a:lstStyle/>
+          <a:p>
+            <a:endParaRPr lang="hu-HU" dirty="0"/>
+          </a:p>
+        </p:txBody>
+      </p:sp>
+      <p:sp>
+        <p:nvSpPr>
+          <p:cNvPr id="5" name="Dia számának helye 4">
+            <a:extLst>
+              <a:ext uri="{FF2B5EF4-FFF2-40B4-BE49-F238E27FC236}">
+                <a16:creationId xmlns:a16="http://schemas.microsoft.com/office/drawing/2014/main" id="{D15FFE7B-BCCA-F723-ACE8-474D143BFF52}"/>
+              </a:ext>
+            </a:extLst>
+          </p:cNvPr>
+          <p:cNvSpPr>
+            <a:spLocks noGrp="1"/>
+          </p:cNvSpPr>
+          <p:nvPr>
+            <p:ph type="sldNum" sz="quarter" idx="12"/>
+          </p:nvPr>
+        </p:nvSpPr>
+        <p:spPr/>
+        <p:txBody>
+          <a:bodyPr/>
+          <a:lstStyle/>
+          <a:p>
+            <a:pPr marL="0" algn="l" defTabSz="914400" rtl="0" eaLnBrk="1" latinLnBrk="0" hangingPunct="1"/>
+            <a:endParaRPr lang="hu-HU" dirty="0"/>
+          </a:p>
+        </p:txBody>
+      </p:sp>
+      <p:pic>
+        <p:nvPicPr>
+          <p:cNvPr id="25" name="Tartalom helye 24" descr="A képen szöveg, sor, Diagram, diagram látható&#10;&#10;Automatikusan generált leírás">
+            <a:extLst>
+              <a:ext uri="{FF2B5EF4-FFF2-40B4-BE49-F238E27FC236}">
+                <a16:creationId xmlns:a16="http://schemas.microsoft.com/office/drawing/2014/main" id="{CE0527A9-DCDC-7142-71A0-C91818F69241}"/>
+              </a:ext>
+            </a:extLst>
+          </p:cNvPr>
+          <p:cNvPicPr>
+            <a:picLocks noGrp="1" noChangeAspect="1"/>
+          </p:cNvPicPr>
           <p:nvPr>
             <p:ph idx="1"/>
           </p:nvPr>
-        </p:nvSpPr>
+        </p:nvPicPr>
+        <p:blipFill>
+          <a:blip r:embed="rId3">
+            <a:extLst>
+              <a:ext uri="{28A0092B-C50C-407E-A947-70E740481C1C}">
+                <a14:useLocalDpi xmlns:a14="http://schemas.microsoft.com/office/drawing/2010/main" val="0"/>
+              </a:ext>
+            </a:extLst>
+          </a:blip>
+          <a:stretch>
+            <a:fillRect/>
+          </a:stretch>
+        </p:blipFill>
         <p:spPr>
           <a:xfrm>
-            <a:off x="838200" y="1253331"/>
-            <a:ext cx="10515600" cy="4351338"/>
+            <a:off x="0" y="1374387"/>
+            <a:ext cx="6096000" cy="2770909"/>
           </a:xfrm>
         </p:spPr>
-        <p:txBody>
-          <a:bodyPr>
-            <a:normAutofit fontScale="92500" lnSpcReduction="20000"/>
-          </a:bodyPr>
-          <a:lstStyle/>
-          <a:p>
-            <a:r>
-              <a:rPr lang="hu-HU" dirty="0"/>
-              <a:t>A kísérleteit viszonylag egy adott beágyazási modell és adathalmaz esetére végezte el - mit gondol mennyire általánosak a kapott eredmények, van-e esetleg okunk azt gondolni, hogy más beágyazás vagy adathalmaz esetén is hasonló eredményeket kapnánk?</a:t>
-            </a:r>
-          </a:p>
-          <a:p>
-            <a:endParaRPr lang="hu-HU" dirty="0"/>
-          </a:p>
-          <a:p>
-            <a:pPr marL="0" indent="0">
-              <a:buNone/>
-            </a:pPr>
-            <a:r>
-              <a:rPr lang="hu-HU" dirty="0"/>
-              <a:t>Válasz:</a:t>
-            </a:r>
-          </a:p>
-          <a:p>
-            <a:pPr marL="0" indent="0">
-              <a:buNone/>
-            </a:pPr>
-            <a:r>
-              <a:rPr lang="hu-HU" dirty="0"/>
-              <a:t>A </a:t>
-            </a:r>
-            <a:r>
-              <a:rPr lang="hu-HU" dirty="0" err="1"/>
-              <a:t>SQuAD</a:t>
-            </a:r>
-            <a:r>
-              <a:rPr lang="hu-HU" dirty="0"/>
-              <a:t> egy QA típusú adathalmaz, amelyhez az </a:t>
-            </a:r>
-            <a:r>
-              <a:rPr lang="hu-HU" dirty="0" err="1"/>
-              <a:t>all-MiniLM</a:t>
-            </a:r>
-            <a:r>
-              <a:rPr lang="hu-HU" dirty="0"/>
-              <a:t> jól passzol, mert mondatpárok összehasonlítására is </a:t>
-            </a:r>
-            <a:r>
-              <a:rPr lang="hu-HU" dirty="0" err="1"/>
-              <a:t>finomhangolva</a:t>
-            </a:r>
-            <a:r>
-              <a:rPr lang="hu-HU" dirty="0"/>
-              <a:t> lett. Azonban a </a:t>
-            </a:r>
-            <a:r>
-              <a:rPr lang="hu-HU" dirty="0" err="1"/>
-              <a:t>Snowflake</a:t>
-            </a:r>
-            <a:r>
-              <a:rPr lang="hu-HU" dirty="0"/>
-              <a:t> modell által mutatott eredmények ugyanazokat a trendeket mutatják, mint az </a:t>
-            </a:r>
-            <a:r>
-              <a:rPr lang="hu-HU" dirty="0" err="1"/>
-              <a:t>all-MiniLM</a:t>
-            </a:r>
-            <a:r>
-              <a:rPr lang="hu-HU" dirty="0"/>
-              <a:t> esetén.</a:t>
-            </a:r>
-          </a:p>
-          <a:p>
-            <a:pPr marL="0" indent="0">
-              <a:buNone/>
-            </a:pPr>
-            <a:r>
-              <a:rPr lang="hu-HU" dirty="0"/>
-              <a:t>Más típusú adathalmazok vizsgálata célszerű lehet, de hasonló eredményekre számítok.</a:t>
-            </a:r>
-          </a:p>
-        </p:txBody>
-      </p:sp>
-      <p:sp>
-        <p:nvSpPr>
-          <p:cNvPr id="5" name="Dia számának helye 4">
-            <a:extLst>
-              <a:ext uri="{FF2B5EF4-FFF2-40B4-BE49-F238E27FC236}">
-                <a16:creationId xmlns:a16="http://schemas.microsoft.com/office/drawing/2014/main" id="{D5B467D2-401F-D6C0-10A7-A4565B8AE6D9}"/>
-              </a:ext>
-            </a:extLst>
-          </p:cNvPr>
-          <p:cNvSpPr>
-            <a:spLocks noGrp="1"/>
-          </p:cNvSpPr>
-          <p:nvPr>
-            <p:ph type="sldNum" sz="quarter" idx="12"/>
-          </p:nvPr>
-        </p:nvSpPr>
-        <p:spPr/>
-        <p:txBody>
-          <a:bodyPr/>
-          <a:lstStyle/>
-          <a:p>
-            <a:endParaRPr lang="hu-HU" dirty="0"/>
-          </a:p>
-        </p:txBody>
-      </p:sp>
+      </p:pic>
+      <p:pic>
+        <p:nvPicPr>
+          <p:cNvPr id="27" name="Kép 26" descr="A képen szöveg, sor, Diagram, Betűtípus látható&#10;&#10;Automatikusan generált leírás">
+            <a:extLst>
+              <a:ext uri="{FF2B5EF4-FFF2-40B4-BE49-F238E27FC236}">
+                <a16:creationId xmlns:a16="http://schemas.microsoft.com/office/drawing/2014/main" id="{EFF63355-4441-C47C-C10A-AE24B3BE7656}"/>
+              </a:ext>
+            </a:extLst>
+          </p:cNvPr>
+          <p:cNvPicPr>
+            <a:picLocks noChangeAspect="1"/>
+          </p:cNvPicPr>
+          <p:nvPr/>
+        </p:nvPicPr>
+        <p:blipFill>
+          <a:blip r:embed="rId4">
+            <a:extLst>
+              <a:ext uri="{28A0092B-C50C-407E-A947-70E740481C1C}">
+                <a14:useLocalDpi xmlns:a14="http://schemas.microsoft.com/office/drawing/2010/main" val="0"/>
+              </a:ext>
+            </a:extLst>
+          </a:blip>
+          <a:stretch>
+            <a:fillRect/>
+          </a:stretch>
+        </p:blipFill>
+        <p:spPr>
+          <a:xfrm>
+            <a:off x="6096000" y="1374388"/>
+            <a:ext cx="6095999" cy="2770909"/>
+          </a:xfrm>
+          <a:prstGeom prst="rect">
+            <a:avLst/>
+          </a:prstGeom>
+        </p:spPr>
+      </p:pic>
+      <p:pic>
+        <p:nvPicPr>
+          <p:cNvPr id="29" name="Kép 28" descr="A képen szöveg, sor, képernyőkép, Diagram látható&#10;&#10;Automatikusan generált leírás">
+            <a:extLst>
+              <a:ext uri="{FF2B5EF4-FFF2-40B4-BE49-F238E27FC236}">
+                <a16:creationId xmlns:a16="http://schemas.microsoft.com/office/drawing/2014/main" id="{91F1A2F7-F0B7-6BCB-9E60-95C5091006FE}"/>
+              </a:ext>
+            </a:extLst>
+          </p:cNvPr>
+          <p:cNvPicPr>
+            <a:picLocks noChangeAspect="1"/>
+          </p:cNvPicPr>
+          <p:nvPr/>
+        </p:nvPicPr>
+        <p:blipFill>
+          <a:blip r:embed="rId5">
+            <a:extLst>
+              <a:ext uri="{28A0092B-C50C-407E-A947-70E740481C1C}">
+                <a14:useLocalDpi xmlns:a14="http://schemas.microsoft.com/office/drawing/2010/main" val="0"/>
+              </a:ext>
+            </a:extLst>
+          </a:blip>
+          <a:stretch>
+            <a:fillRect/>
+          </a:stretch>
+        </p:blipFill>
+        <p:spPr>
+          <a:xfrm>
+            <a:off x="-3600" y="3940106"/>
+            <a:ext cx="6098400" cy="2772000"/>
+          </a:xfrm>
+          <a:prstGeom prst="rect">
+            <a:avLst/>
+          </a:prstGeom>
+        </p:spPr>
+      </p:pic>
+      <p:pic>
+        <p:nvPicPr>
+          <p:cNvPr id="31" name="Kép 30" descr="A képen szöveg, sor, diagram, Diagram látható&#10;&#10;Automatikusan generált leírás">
+            <a:extLst>
+              <a:ext uri="{FF2B5EF4-FFF2-40B4-BE49-F238E27FC236}">
+                <a16:creationId xmlns:a16="http://schemas.microsoft.com/office/drawing/2014/main" id="{A271C484-B3A3-F8E7-CD05-349FDF08D31A}"/>
+              </a:ext>
+            </a:extLst>
+          </p:cNvPr>
+          <p:cNvPicPr>
+            <a:picLocks noChangeAspect="1"/>
+          </p:cNvPicPr>
+          <p:nvPr/>
+        </p:nvPicPr>
+        <p:blipFill>
+          <a:blip r:embed="rId6">
+            <a:extLst>
+              <a:ext uri="{28A0092B-C50C-407E-A947-70E740481C1C}">
+                <a14:useLocalDpi xmlns:a14="http://schemas.microsoft.com/office/drawing/2010/main" val="0"/>
+              </a:ext>
+            </a:extLst>
+          </a:blip>
+          <a:stretch>
+            <a:fillRect/>
+          </a:stretch>
+        </p:blipFill>
+        <p:spPr>
+          <a:xfrm>
+            <a:off x="6094800" y="4020641"/>
+            <a:ext cx="6098399" cy="2772000"/>
+          </a:xfrm>
+          <a:prstGeom prst="rect">
+            <a:avLst/>
+          </a:prstGeom>
+        </p:spPr>
+      </p:pic>
     </p:spTree>
     <p:extLst>
       <p:ext uri="{BB962C8B-B14F-4D97-AF65-F5344CB8AC3E}">
-        <p14:creationId xmlns:p14="http://schemas.microsoft.com/office/powerpoint/2010/main" val="4292615990"/>
+        <p14:creationId xmlns:p14="http://schemas.microsoft.com/office/powerpoint/2010/main" val="3290175147"/>
       </p:ext>
     </p:extLst>
   </p:cSld>
@@ -13628,7 +14317,7 @@
           <p:cNvPr id="2" name="Cím 1">
             <a:extLst>
               <a:ext uri="{FF2B5EF4-FFF2-40B4-BE49-F238E27FC236}">
-                <a16:creationId xmlns:a16="http://schemas.microsoft.com/office/drawing/2014/main" id="{AFFD2839-A558-CE58-D988-2A70BB3D814C}"/>
+                <a16:creationId xmlns:a16="http://schemas.microsoft.com/office/drawing/2014/main" id="{A5C2D948-E810-3B60-6951-A5D022A784E3}"/>
               </a:ext>
             </a:extLst>
           </p:cNvPr>
@@ -13646,8 +14335,12 @@
           <a:p>
             <a:r>
               <a:rPr lang="hu-HU" dirty="0"/>
-              <a:t>Kérdés 3/3</a:t>
-            </a:r>
+              <a:t>Kérdés 2/6</a:t>
+            </a:r>
+            <a:br>
+              <a:rPr lang="hu-HU" dirty="0"/>
+            </a:br>
+            <a:endParaRPr lang="hu-HU" dirty="0"/>
           </a:p>
         </p:txBody>
       </p:sp>
@@ -13656,7 +14349,7 @@
           <p:cNvPr id="3" name="Tartalom helye 2">
             <a:extLst>
               <a:ext uri="{FF2B5EF4-FFF2-40B4-BE49-F238E27FC236}">
-                <a16:creationId xmlns:a16="http://schemas.microsoft.com/office/drawing/2014/main" id="{61CBE8E2-710D-D873-97C2-3629D7B4CA21}"/>
+                <a16:creationId xmlns:a16="http://schemas.microsoft.com/office/drawing/2014/main" id="{7F04CF62-587D-AB1F-2779-C1194997BECE}"/>
               </a:ext>
             </a:extLst>
           </p:cNvPr>
@@ -13667,7 +14360,12 @@
             <p:ph idx="1"/>
           </p:nvPr>
         </p:nvSpPr>
-        <p:spPr/>
+        <p:spPr>
+          <a:xfrm>
+            <a:off x="838200" y="1253331"/>
+            <a:ext cx="10515600" cy="4351338"/>
+          </a:xfrm>
+        </p:spPr>
         <p:txBody>
           <a:bodyPr>
             <a:normAutofit fontScale="92500" lnSpcReduction="20000"/>
@@ -13676,23 +14374,7 @@
           <a:p>
             <a:r>
               <a:rPr lang="hu-HU" dirty="0"/>
-              <a:t>A kísérleteiben a javasolt </a:t>
-            </a:r>
-            <a:r>
-              <a:rPr lang="hu-HU" dirty="0" err="1"/>
-              <a:t>klaszterezés</a:t>
-            </a:r>
-            <a:r>
-              <a:rPr lang="hu-HU" dirty="0"/>
-              <a:t>-alapú módszerek a minőség rovására javítanak a hatékonyságon a szokásos kereséshez képest. Tudja-e esetleg konkretizálni, hogy milyen alkalmazások, vagy szcenáriók esetén érné meg inkább a </a:t>
-            </a:r>
-            <a:r>
-              <a:rPr lang="hu-HU" dirty="0" err="1"/>
-              <a:t>klaszterezést</a:t>
-            </a:r>
-            <a:r>
-              <a:rPr lang="hu-HU" dirty="0"/>
-              <a:t> használni a bevett módszerekkel szemben?</a:t>
+              <a:t>A kísérleteit viszonylag egy adott beágyazási modell és adathalmaz esetére végezte el - mit gondol mennyire általánosak a kapott eredmények, van-e esetleg okunk azt gondolni, hogy más beágyazás vagy adathalmaz esetén is hasonló eredményeket kapnánk?</a:t>
             </a:r>
           </a:p>
           <a:p>
@@ -13713,37 +14395,74 @@
             </a:pPr>
             <a:r>
               <a:rPr lang="hu-HU" dirty="0"/>
-              <a:t>Olyan dinamikusan változó tudásbázisok esetén, ahol az új információk témája előre nem látható módon és gyorsan változik, a rendszernek pedig valós időben kell integrálni az új adatokat.</a:t>
-            </a:r>
-          </a:p>
-          <a:p>
-            <a:r>
-              <a:rPr lang="hu-HU" dirty="0"/>
-              <a:t>Valós idejű híráram és közösségi média</a:t>
-            </a:r>
-          </a:p>
-          <a:p>
-            <a:r>
-              <a:rPr lang="hu-HU" dirty="0"/>
-              <a:t>Élő ügyfélszolgálat chatbot</a:t>
-            </a:r>
-          </a:p>
-        </p:txBody>
-      </p:sp>
-      <p:sp>
-        <p:nvSpPr>
-          <p:cNvPr id="4" name="Dátum helye 3">
-            <a:extLst>
-              <a:ext uri="{FF2B5EF4-FFF2-40B4-BE49-F238E27FC236}">
-                <a16:creationId xmlns:a16="http://schemas.microsoft.com/office/drawing/2014/main" id="{72380C67-3C45-D763-3973-7ED6B3540198}"/>
-              </a:ext>
-            </a:extLst>
-          </p:cNvPr>
-          <p:cNvSpPr>
-            <a:spLocks noGrp="1"/>
-          </p:cNvSpPr>
-          <p:nvPr>
-            <p:ph type="dt" sz="half" idx="10"/>
+              <a:t>A </a:t>
+            </a:r>
+            <a:r>
+              <a:rPr lang="hu-HU" dirty="0" err="1"/>
+              <a:t>SQuAD</a:t>
+            </a:r>
+            <a:r>
+              <a:rPr lang="hu-HU" dirty="0"/>
+              <a:t> egy QA típusú adathalmaz, amelyhez az </a:t>
+            </a:r>
+            <a:r>
+              <a:rPr lang="hu-HU" dirty="0" err="1"/>
+              <a:t>all-MiniLM</a:t>
+            </a:r>
+            <a:r>
+              <a:rPr lang="hu-HU" dirty="0"/>
+              <a:t> jól passzol, mert mondatpárok összehasonlítására is </a:t>
+            </a:r>
+            <a:r>
+              <a:rPr lang="hu-HU" dirty="0" err="1"/>
+              <a:t>finomhangolva</a:t>
+            </a:r>
+            <a:r>
+              <a:rPr lang="hu-HU" dirty="0"/>
+              <a:t> lett. Azonban a </a:t>
+            </a:r>
+            <a:r>
+              <a:rPr lang="hu-HU" dirty="0" err="1"/>
+              <a:t>Snowflake</a:t>
+            </a:r>
+            <a:r>
+              <a:rPr lang="hu-HU" dirty="0"/>
+              <a:t> modell által mutatott eredmények ugyanazokat a trendeket mutatják, mint az </a:t>
+            </a:r>
+            <a:r>
+              <a:rPr lang="hu-HU" dirty="0" err="1"/>
+              <a:t>all-MiniLM</a:t>
+            </a:r>
+            <a:r>
+              <a:rPr lang="hu-HU" dirty="0"/>
+              <a:t> esetén.</a:t>
+            </a:r>
+          </a:p>
+          <a:p>
+            <a:pPr marL="0" indent="0">
+              <a:buNone/>
+            </a:pPr>
+            <a:r>
+              <a:rPr lang="hu-HU" dirty="0"/>
+              <a:t>Más típusú adathalmazok vizsgálata célszerű lehet, de hasonló eredményekre számítok.</a:t>
+            </a:r>
+          </a:p>
+        </p:txBody>
+      </p:sp>
+      <p:sp>
+        <p:nvSpPr>
+          <p:cNvPr id="5" name="Dia számának helye 4">
+            <a:extLst>
+              <a:ext uri="{FF2B5EF4-FFF2-40B4-BE49-F238E27FC236}">
+                <a16:creationId xmlns:a16="http://schemas.microsoft.com/office/drawing/2014/main" id="{D5B467D2-401F-D6C0-10A7-A4565B8AE6D9}"/>
+              </a:ext>
+            </a:extLst>
+          </p:cNvPr>
+          <p:cNvSpPr>
+            <a:spLocks noGrp="1"/>
+          </p:cNvSpPr>
+          <p:nvPr>
+            <p:ph type="sldNum" sz="quarter" idx="12"/>
           </p:nvPr>
         </p:nvSpPr>
         <p:spPr/>
@@ -13758,7 +14477,7 @@
     </p:spTree>
     <p:extLst>
       <p:ext uri="{BB962C8B-B14F-4D97-AF65-F5344CB8AC3E}">
-        <p14:creationId xmlns:p14="http://schemas.microsoft.com/office/powerpoint/2010/main" val="4241420566"/>
+        <p14:creationId xmlns:p14="http://schemas.microsoft.com/office/powerpoint/2010/main" val="4292615990"/>
       </p:ext>
     </p:extLst>
   </p:cSld>
@@ -13790,7 +14509,7 @@
           <p:cNvPr id="2" name="Cím 1">
             <a:extLst>
               <a:ext uri="{FF2B5EF4-FFF2-40B4-BE49-F238E27FC236}">
-                <a16:creationId xmlns:a16="http://schemas.microsoft.com/office/drawing/2014/main" id="{02242FBB-2962-2D0C-F440-AE52FF32F22D}"/>
+                <a16:creationId xmlns:a16="http://schemas.microsoft.com/office/drawing/2014/main" id="{B67422EA-7398-724E-82EE-D82CC4D20A49}"/>
               </a:ext>
             </a:extLst>
           </p:cNvPr>
@@ -13808,474 +14527,64 @@
           <a:p>
             <a:r>
               <a:rPr lang="hu-HU" dirty="0"/>
-              <a:t>Forrásjegyzék</a:t>
-            </a:r>
-          </a:p>
-        </p:txBody>
-      </p:sp>
-      <p:sp>
-        <p:nvSpPr>
-          <p:cNvPr id="3" name="Tartalom helye 2">
-            <a:extLst>
-              <a:ext uri="{FF2B5EF4-FFF2-40B4-BE49-F238E27FC236}">
-                <a16:creationId xmlns:a16="http://schemas.microsoft.com/office/drawing/2014/main" id="{448F6325-171C-9526-86E2-566A20E5EABC}"/>
-              </a:ext>
-            </a:extLst>
-          </p:cNvPr>
-          <p:cNvSpPr>
-            <a:spLocks noGrp="1"/>
-          </p:cNvSpPr>
+              <a:t>Kérdés 2/6</a:t>
+            </a:r>
+          </a:p>
+        </p:txBody>
+      </p:sp>
+      <p:pic>
+        <p:nvPicPr>
+          <p:cNvPr id="7" name="Tartalom helye 6" descr="A képen szöveg, sor, képernyőkép, Diagram látható&#10;&#10;Automatikusan generált leírás">
+            <a:extLst>
+              <a:ext uri="{FF2B5EF4-FFF2-40B4-BE49-F238E27FC236}">
+                <a16:creationId xmlns:a16="http://schemas.microsoft.com/office/drawing/2014/main" id="{FD5A7E95-601A-5FB2-794F-3D74692F85BB}"/>
+              </a:ext>
+            </a:extLst>
+          </p:cNvPr>
+          <p:cNvPicPr>
+            <a:picLocks noGrp="1" noChangeAspect="1"/>
+          </p:cNvPicPr>
           <p:nvPr>
             <p:ph idx="1"/>
           </p:nvPr>
+        </p:nvPicPr>
+        <p:blipFill>
+          <a:blip r:embed="rId3">
+            <a:extLst>
+              <a:ext uri="{28A0092B-C50C-407E-A947-70E740481C1C}">
+                <a14:useLocalDpi xmlns:a14="http://schemas.microsoft.com/office/drawing/2010/main" val="0"/>
+              </a:ext>
+            </a:extLst>
+          </a:blip>
+          <a:stretch>
+            <a:fillRect/>
+          </a:stretch>
+        </p:blipFill>
+        <p:spPr>
+          <a:xfrm>
+            <a:off x="944040" y="1397794"/>
+            <a:ext cx="10303920" cy="4683600"/>
+          </a:xfrm>
+        </p:spPr>
+      </p:pic>
+      <p:sp>
+        <p:nvSpPr>
+          <p:cNvPr id="4" name="Dátum helye 3">
+            <a:extLst>
+              <a:ext uri="{FF2B5EF4-FFF2-40B4-BE49-F238E27FC236}">
+                <a16:creationId xmlns:a16="http://schemas.microsoft.com/office/drawing/2014/main" id="{2DB71D7F-EB65-674D-645A-C74E585745C1}"/>
+              </a:ext>
+            </a:extLst>
+          </p:cNvPr>
+          <p:cNvSpPr>
+            <a:spLocks noGrp="1"/>
+          </p:cNvSpPr>
+          <p:nvPr>
+            <p:ph type="dt" sz="half" idx="10"/>
+          </p:nvPr>
         </p:nvSpPr>
         <p:spPr/>
         <p:txBody>
-          <a:bodyPr>
-            <a:normAutofit/>
-          </a:bodyPr>
-          <a:lstStyle/>
-          <a:p>
-            <a:r>
-              <a:rPr lang="hu-HU" sz="1800" dirty="0"/>
-              <a:t>[1] </a:t>
-            </a:r>
-            <a:r>
-              <a:rPr lang="hu-HU" sz="1800" dirty="0" err="1"/>
-              <a:t>Hariom</a:t>
-            </a:r>
-            <a:r>
-              <a:rPr lang="hu-HU" sz="1800" dirty="0"/>
-              <a:t> </a:t>
-            </a:r>
-            <a:r>
-              <a:rPr lang="hu-HU" sz="1800" dirty="0" err="1"/>
-              <a:t>Gautam</a:t>
-            </a:r>
-            <a:r>
-              <a:rPr lang="hu-HU" sz="1800" dirty="0"/>
-              <a:t>, (2020.03.01.), Word </a:t>
-            </a:r>
-            <a:r>
-              <a:rPr lang="hu-HU" sz="1800" dirty="0" err="1"/>
-              <a:t>Embedding</a:t>
-            </a:r>
-            <a:r>
-              <a:rPr lang="hu-HU" sz="1800" dirty="0"/>
-              <a:t>: </a:t>
-            </a:r>
-            <a:r>
-              <a:rPr lang="hu-HU" sz="1800" dirty="0" err="1"/>
-              <a:t>Basics</a:t>
-            </a:r>
-            <a:r>
-              <a:rPr lang="hu-HU" sz="1800" dirty="0"/>
-              <a:t>, </a:t>
-            </a:r>
-            <a:r>
-              <a:rPr lang="hu-HU" sz="1800" dirty="0" err="1"/>
-              <a:t>Medium</a:t>
-            </a:r>
-            <a:r>
-              <a:rPr lang="hu-HU" sz="1800" dirty="0"/>
-              <a:t>, </a:t>
-            </a:r>
-            <a:r>
-              <a:rPr lang="hu-HU" sz="1800" dirty="0">
-                <a:hlinkClick r:id="rId3"/>
-              </a:rPr>
-              <a:t>https://medium.com/@hari4om/word-embedding-d816f643140</a:t>
-            </a:r>
-            <a:endParaRPr lang="hu-HU" sz="1800" dirty="0"/>
-          </a:p>
-          <a:p>
-            <a:r>
-              <a:rPr lang="hu-HU" sz="1800" dirty="0"/>
-              <a:t>[2] </a:t>
-            </a:r>
-            <a:r>
-              <a:rPr lang="hu-HU" sz="1800" dirty="0" err="1"/>
-              <a:t>Varun</a:t>
-            </a:r>
-            <a:r>
-              <a:rPr lang="hu-HU" sz="1800" dirty="0"/>
-              <a:t>, (2020.09.27.), </a:t>
-            </a:r>
-            <a:r>
-              <a:rPr lang="hu-HU" sz="1800" dirty="0" err="1"/>
-              <a:t>Cosine</a:t>
-            </a:r>
-            <a:r>
-              <a:rPr lang="hu-HU" sz="1800" dirty="0"/>
-              <a:t> </a:t>
-            </a:r>
-            <a:r>
-              <a:rPr lang="hu-HU" sz="1800" dirty="0" err="1"/>
-              <a:t>similarity</a:t>
-            </a:r>
-            <a:r>
-              <a:rPr lang="hu-HU" sz="1800" dirty="0"/>
-              <a:t>: </a:t>
-            </a:r>
-            <a:r>
-              <a:rPr lang="hu-HU" sz="1800" dirty="0" err="1"/>
-              <a:t>How</a:t>
-            </a:r>
-            <a:r>
-              <a:rPr lang="hu-HU" sz="1800" dirty="0"/>
-              <a:t> </a:t>
-            </a:r>
-            <a:r>
-              <a:rPr lang="hu-HU" sz="1800" dirty="0" err="1"/>
-              <a:t>does</a:t>
-            </a:r>
-            <a:r>
-              <a:rPr lang="hu-HU" sz="1800" dirty="0"/>
-              <a:t> </a:t>
-            </a:r>
-            <a:r>
-              <a:rPr lang="hu-HU" sz="1800" dirty="0" err="1"/>
-              <a:t>it</a:t>
-            </a:r>
-            <a:r>
-              <a:rPr lang="hu-HU" sz="1800" dirty="0"/>
-              <a:t> </a:t>
-            </a:r>
-            <a:r>
-              <a:rPr lang="hu-HU" sz="1800" dirty="0" err="1"/>
-              <a:t>measure</a:t>
-            </a:r>
-            <a:r>
-              <a:rPr lang="hu-HU" sz="1800" dirty="0"/>
-              <a:t> </a:t>
-            </a:r>
-            <a:r>
-              <a:rPr lang="hu-HU" sz="1800" dirty="0" err="1"/>
-              <a:t>the</a:t>
-            </a:r>
-            <a:r>
-              <a:rPr lang="hu-HU" sz="1800" dirty="0"/>
-              <a:t> </a:t>
-            </a:r>
-            <a:r>
-              <a:rPr lang="hu-HU" sz="1800" dirty="0" err="1"/>
-              <a:t>similarity</a:t>
-            </a:r>
-            <a:r>
-              <a:rPr lang="hu-HU" sz="1800" dirty="0"/>
-              <a:t>, </a:t>
-            </a:r>
-            <a:r>
-              <a:rPr lang="hu-HU" sz="1800" dirty="0" err="1"/>
-              <a:t>Maths</a:t>
-            </a:r>
-            <a:r>
-              <a:rPr lang="hu-HU" sz="1800" dirty="0"/>
-              <a:t> </a:t>
-            </a:r>
-            <a:r>
-              <a:rPr lang="hu-HU" sz="1800" dirty="0" err="1"/>
-              <a:t>behind</a:t>
-            </a:r>
-            <a:r>
-              <a:rPr lang="hu-HU" sz="1800" dirty="0"/>
-              <a:t> and </a:t>
-            </a:r>
-            <a:r>
-              <a:rPr lang="hu-HU" sz="1800" dirty="0" err="1"/>
-              <a:t>usage</a:t>
-            </a:r>
-            <a:r>
-              <a:rPr lang="hu-HU" sz="1800" dirty="0"/>
-              <a:t> in Python, towardsdatascience.com ,</a:t>
-            </a:r>
-            <a:r>
-              <a:rPr lang="hu-HU" sz="1800" dirty="0">
-                <a:hlinkClick r:id="rId4"/>
-              </a:rPr>
-              <a:t>https://towardsdatascience.com/cosine-similarity-how-does-it-measure-the-similarity-maths-behind-and-usage-in-python-50ad30aad7db/</a:t>
-            </a:r>
-            <a:endParaRPr lang="hu-HU" sz="1800" dirty="0"/>
-          </a:p>
-          <a:p>
-            <a:r>
-              <a:rPr lang="hu-HU" sz="1800" dirty="0"/>
-              <a:t>[3] </a:t>
-            </a:r>
-            <a:r>
-              <a:rPr lang="hu-HU" sz="1800" dirty="0" err="1">
-                <a:solidFill>
-                  <a:srgbClr val="000000"/>
-                </a:solidFill>
-                <a:effectLst/>
-              </a:rPr>
-              <a:t>Pranav</a:t>
-            </a:r>
-            <a:r>
-              <a:rPr lang="hu-HU" sz="1800" dirty="0">
-                <a:solidFill>
-                  <a:srgbClr val="000000"/>
-                </a:solidFill>
-                <a:effectLst/>
-              </a:rPr>
-              <a:t> </a:t>
-            </a:r>
-            <a:r>
-              <a:rPr lang="hu-HU" sz="1800" dirty="0" err="1">
-                <a:solidFill>
-                  <a:srgbClr val="000000"/>
-                </a:solidFill>
-                <a:effectLst/>
-              </a:rPr>
-              <a:t>Rajpurkar</a:t>
-            </a:r>
-            <a:r>
-              <a:rPr lang="hu-HU" sz="1800" dirty="0">
-                <a:solidFill>
-                  <a:srgbClr val="000000"/>
-                </a:solidFill>
-                <a:effectLst/>
-              </a:rPr>
-              <a:t>, </a:t>
-            </a:r>
-            <a:r>
-              <a:rPr lang="hu-HU" sz="1800" dirty="0" err="1">
-                <a:solidFill>
-                  <a:srgbClr val="000000"/>
-                </a:solidFill>
-                <a:effectLst/>
-              </a:rPr>
-              <a:t>Jian</a:t>
-            </a:r>
-            <a:r>
-              <a:rPr lang="hu-HU" sz="1800" dirty="0">
-                <a:solidFill>
-                  <a:srgbClr val="000000"/>
-                </a:solidFill>
-                <a:effectLst/>
-              </a:rPr>
-              <a:t> </a:t>
-            </a:r>
-            <a:r>
-              <a:rPr lang="hu-HU" sz="1800" dirty="0" err="1">
-                <a:solidFill>
-                  <a:srgbClr val="000000"/>
-                </a:solidFill>
-                <a:effectLst/>
-              </a:rPr>
-              <a:t>Zhang</a:t>
-            </a:r>
-            <a:r>
-              <a:rPr lang="hu-HU" sz="1800" dirty="0">
-                <a:solidFill>
-                  <a:srgbClr val="000000"/>
-                </a:solidFill>
-                <a:effectLst/>
-              </a:rPr>
-              <a:t>, </a:t>
-            </a:r>
-            <a:r>
-              <a:rPr lang="hu-HU" sz="1800" dirty="0">
-                <a:effectLst/>
-              </a:rPr>
-              <a:t>Konstantin</a:t>
-            </a:r>
-            <a:r>
-              <a:rPr lang="hu-HU" sz="1800" dirty="0">
-                <a:solidFill>
-                  <a:srgbClr val="000000"/>
-                </a:solidFill>
-                <a:effectLst/>
-              </a:rPr>
-              <a:t> </a:t>
-            </a:r>
-            <a:r>
-              <a:rPr lang="hu-HU" sz="1800" dirty="0" err="1">
-                <a:solidFill>
-                  <a:srgbClr val="000000"/>
-                </a:solidFill>
-                <a:effectLst/>
-              </a:rPr>
-              <a:t>Lopyrev</a:t>
-            </a:r>
-            <a:r>
-              <a:rPr lang="hu-HU" sz="1800" dirty="0">
-                <a:solidFill>
-                  <a:srgbClr val="000000"/>
-                </a:solidFill>
-                <a:effectLst/>
-              </a:rPr>
-              <a:t>, Percy </a:t>
-            </a:r>
-            <a:r>
-              <a:rPr lang="hu-HU" sz="1800" dirty="0" err="1">
-                <a:solidFill>
-                  <a:srgbClr val="000000"/>
-                </a:solidFill>
-                <a:effectLst/>
-              </a:rPr>
-              <a:t>Liang</a:t>
-            </a:r>
-            <a:r>
-              <a:rPr lang="hu-HU" sz="1800" dirty="0">
-                <a:solidFill>
-                  <a:srgbClr val="000000"/>
-                </a:solidFill>
-                <a:effectLst/>
-              </a:rPr>
-              <a:t>, (2016.06.16.),</a:t>
-            </a:r>
-            <a:r>
-              <a:rPr lang="hu-HU" sz="1800" dirty="0" err="1">
-                <a:solidFill>
-                  <a:srgbClr val="000000"/>
-                </a:solidFill>
-                <a:effectLst/>
-              </a:rPr>
-              <a:t>SQuAD</a:t>
-            </a:r>
-            <a:r>
-              <a:rPr lang="hu-HU" sz="1800" dirty="0">
-                <a:solidFill>
-                  <a:srgbClr val="000000"/>
-                </a:solidFill>
-                <a:effectLst/>
-              </a:rPr>
-              <a:t>:</a:t>
-            </a:r>
-          </a:p>
-          <a:p>
-            <a:r>
-              <a:rPr lang="hu-HU" sz="1800" dirty="0">
-                <a:solidFill>
-                  <a:srgbClr val="000000"/>
-                </a:solidFill>
-                <a:effectLst/>
-              </a:rPr>
-              <a:t>100,000+ </a:t>
-            </a:r>
-            <a:r>
-              <a:rPr lang="hu-HU" sz="1800" dirty="0" err="1">
-                <a:solidFill>
-                  <a:srgbClr val="000000"/>
-                </a:solidFill>
-                <a:effectLst/>
-              </a:rPr>
-              <a:t>Questions</a:t>
-            </a:r>
-            <a:r>
-              <a:rPr lang="hu-HU" sz="1800" dirty="0">
-                <a:solidFill>
-                  <a:srgbClr val="000000"/>
-                </a:solidFill>
-                <a:effectLst/>
-              </a:rPr>
-              <a:t> </a:t>
-            </a:r>
-            <a:r>
-              <a:rPr lang="hu-HU" sz="1800" dirty="0" err="1">
-                <a:solidFill>
-                  <a:srgbClr val="000000"/>
-                </a:solidFill>
-                <a:effectLst/>
-              </a:rPr>
-              <a:t>for</a:t>
-            </a:r>
-            <a:r>
-              <a:rPr lang="hu-HU" sz="1800" dirty="0">
-                <a:solidFill>
-                  <a:srgbClr val="000000"/>
-                </a:solidFill>
-                <a:effectLst/>
-              </a:rPr>
-              <a:t> </a:t>
-            </a:r>
-            <a:r>
-              <a:rPr lang="hu-HU" sz="1800" dirty="0" err="1">
-                <a:solidFill>
-                  <a:srgbClr val="000000"/>
-                </a:solidFill>
-                <a:effectLst/>
-              </a:rPr>
-              <a:t>Machine</a:t>
-            </a:r>
-            <a:r>
-              <a:rPr lang="hu-HU" sz="1800" dirty="0">
-                <a:solidFill>
-                  <a:srgbClr val="000000"/>
-                </a:solidFill>
-                <a:effectLst/>
-              </a:rPr>
-              <a:t> </a:t>
-            </a:r>
-            <a:r>
-              <a:rPr lang="hu-HU" sz="1800" dirty="0" err="1">
-                <a:solidFill>
-                  <a:srgbClr val="000000"/>
-                </a:solidFill>
-                <a:effectLst/>
-              </a:rPr>
-              <a:t>Comprehension</a:t>
-            </a:r>
-            <a:r>
-              <a:rPr lang="hu-HU" sz="1800" dirty="0">
-                <a:solidFill>
-                  <a:srgbClr val="000000"/>
-                </a:solidFill>
-                <a:effectLst/>
-              </a:rPr>
-              <a:t> of Text, </a:t>
-            </a:r>
-            <a:r>
-              <a:rPr lang="hu-HU" sz="1800" dirty="0" err="1">
-                <a:solidFill>
-                  <a:srgbClr val="000000"/>
-                </a:solidFill>
-                <a:effectLst/>
-              </a:rPr>
-              <a:t>ArXiv</a:t>
-            </a:r>
-            <a:r>
-              <a:rPr lang="hu-HU" sz="1800" dirty="0">
-                <a:solidFill>
-                  <a:srgbClr val="000000"/>
-                </a:solidFill>
-                <a:effectLst/>
-              </a:rPr>
-              <a:t>, </a:t>
-            </a:r>
-            <a:r>
-              <a:rPr lang="hu-HU" sz="1800" b="0" i="0" u="sng" dirty="0">
-                <a:effectLst/>
-                <a:hlinkClick r:id="rId5"/>
-              </a:rPr>
-              <a:t>https://doi.org/10.48550/arXiv.1606.05250</a:t>
-            </a:r>
-            <a:endParaRPr lang="hu-HU" sz="1800" dirty="0"/>
-          </a:p>
-          <a:p>
-            <a:endParaRPr lang="hu-HU" sz="2000" dirty="0"/>
-          </a:p>
-        </p:txBody>
-      </p:sp>
-      <p:sp>
-        <p:nvSpPr>
-          <p:cNvPr id="4" name="Dátum helye 3">
-            <a:extLst>
-              <a:ext uri="{FF2B5EF4-FFF2-40B4-BE49-F238E27FC236}">
-                <a16:creationId xmlns:a16="http://schemas.microsoft.com/office/drawing/2014/main" id="{E3AFDC56-C173-DBE4-4AB5-B1829C2CB1E8}"/>
-              </a:ext>
-            </a:extLst>
-          </p:cNvPr>
-          <p:cNvSpPr>
-            <a:spLocks noGrp="1"/>
-          </p:cNvSpPr>
-          <p:nvPr>
-            <p:ph type="dt" sz="half" idx="10"/>
-          </p:nvPr>
-        </p:nvSpPr>
-        <p:spPr/>
-        <p:txBody>
           <a:bodyPr/>
           <a:lstStyle/>
           <a:p>
@@ -14288,7 +14597,7 @@
           <p:cNvPr id="5" name="Dia számának helye 4">
             <a:extLst>
               <a:ext uri="{FF2B5EF4-FFF2-40B4-BE49-F238E27FC236}">
-                <a16:creationId xmlns:a16="http://schemas.microsoft.com/office/drawing/2014/main" id="{68737DFA-5AEE-8E85-0BBC-53632C2E9510}"/>
+                <a16:creationId xmlns:a16="http://schemas.microsoft.com/office/drawing/2014/main" id="{B8B51A08-F296-A854-BF05-4325B04866F2}"/>
               </a:ext>
             </a:extLst>
           </p:cNvPr>
@@ -14312,7 +14621,504 @@
     </p:spTree>
     <p:extLst>
       <p:ext uri="{BB962C8B-B14F-4D97-AF65-F5344CB8AC3E}">
-        <p14:creationId xmlns:p14="http://schemas.microsoft.com/office/powerpoint/2010/main" val="2015096485"/>
+        <p14:creationId xmlns:p14="http://schemas.microsoft.com/office/powerpoint/2010/main" val="485844886"/>
+      </p:ext>
+    </p:extLst>
+  </p:cSld>
+  <p:clrMapOvr>
+    <a:masterClrMapping/>
+  </p:clrMapOvr>
+</p:sld>
+</file>
+
+<file path=ppt/slides/slide27.xml><?xml version="1.0" encoding="utf-8"?>
+<p:sld xmlns:a="http://schemas.openxmlformats.org/drawingml/2006/main" xmlns:r="http://schemas.openxmlformats.org/officeDocument/2006/relationships" xmlns:p="http://schemas.openxmlformats.org/presentationml/2006/main">
+  <p:cSld>
+    <p:spTree>
+      <p:nvGrpSpPr>
+        <p:cNvPr id="1" name=""/>
+        <p:cNvGrpSpPr/>
+        <p:nvPr/>
+      </p:nvGrpSpPr>
+      <p:grpSpPr>
+        <a:xfrm>
+          <a:off x="0" y="0"/>
+          <a:ext cx="0" cy="0"/>
+          <a:chOff x="0" y="0"/>
+          <a:chExt cx="0" cy="0"/>
+        </a:xfrm>
+      </p:grpSpPr>
+      <p:sp>
+        <p:nvSpPr>
+          <p:cNvPr id="2" name="Cím 1">
+            <a:extLst>
+              <a:ext uri="{FF2B5EF4-FFF2-40B4-BE49-F238E27FC236}">
+                <a16:creationId xmlns:a16="http://schemas.microsoft.com/office/drawing/2014/main" id="{AFFD2839-A558-CE58-D988-2A70BB3D814C}"/>
+              </a:ext>
+            </a:extLst>
+          </p:cNvPr>
+          <p:cNvSpPr>
+            <a:spLocks noGrp="1"/>
+          </p:cNvSpPr>
+          <p:nvPr>
+            <p:ph type="title"/>
+          </p:nvPr>
+        </p:nvSpPr>
+        <p:spPr/>
+        <p:txBody>
+          <a:bodyPr/>
+          <a:lstStyle/>
+          <a:p>
+            <a:r>
+              <a:rPr lang="hu-HU" dirty="0"/>
+              <a:t>Kérdés 3/6</a:t>
+            </a:r>
+          </a:p>
+        </p:txBody>
+      </p:sp>
+      <p:sp>
+        <p:nvSpPr>
+          <p:cNvPr id="3" name="Tartalom helye 2">
+            <a:extLst>
+              <a:ext uri="{FF2B5EF4-FFF2-40B4-BE49-F238E27FC236}">
+                <a16:creationId xmlns:a16="http://schemas.microsoft.com/office/drawing/2014/main" id="{61CBE8E2-710D-D873-97C2-3629D7B4CA21}"/>
+              </a:ext>
+            </a:extLst>
+          </p:cNvPr>
+          <p:cNvSpPr>
+            <a:spLocks noGrp="1"/>
+          </p:cNvSpPr>
+          <p:nvPr>
+            <p:ph idx="1"/>
+          </p:nvPr>
+        </p:nvSpPr>
+        <p:spPr/>
+        <p:txBody>
+          <a:bodyPr>
+            <a:normAutofit fontScale="92500" lnSpcReduction="20000"/>
+          </a:bodyPr>
+          <a:lstStyle/>
+          <a:p>
+            <a:r>
+              <a:rPr lang="hu-HU" dirty="0"/>
+              <a:t>A kísérleteiben a javasolt </a:t>
+            </a:r>
+            <a:r>
+              <a:rPr lang="hu-HU" dirty="0" err="1"/>
+              <a:t>klaszterezés</a:t>
+            </a:r>
+            <a:r>
+              <a:rPr lang="hu-HU" dirty="0"/>
+              <a:t>-alapú módszerek a minőség rovására javítanak a hatékonyságon a szokásos kereséshez képest. Tudja-e esetleg konkretizálni, hogy milyen alkalmazások, vagy szcenáriók esetén érné meg inkább a </a:t>
+            </a:r>
+            <a:r>
+              <a:rPr lang="hu-HU" dirty="0" err="1"/>
+              <a:t>klaszterezést</a:t>
+            </a:r>
+            <a:r>
+              <a:rPr lang="hu-HU" dirty="0"/>
+              <a:t> használni a bevett módszerekkel szemben?</a:t>
+            </a:r>
+          </a:p>
+          <a:p>
+            <a:endParaRPr lang="hu-HU" dirty="0"/>
+          </a:p>
+          <a:p>
+            <a:pPr marL="0" indent="0">
+              <a:buNone/>
+            </a:pPr>
+            <a:r>
+              <a:rPr lang="hu-HU" dirty="0"/>
+              <a:t>Válasz:</a:t>
+            </a:r>
+          </a:p>
+          <a:p>
+            <a:pPr marL="0" indent="0">
+              <a:buNone/>
+            </a:pPr>
+            <a:r>
+              <a:rPr lang="hu-HU" dirty="0"/>
+              <a:t>Olyan dinamikusan változó tudásbázisok esetén, ahol az új információk témája előre nem látható módon és gyorsan változik, a rendszernek pedig valós időben kell integrálni az új adatokat.</a:t>
+            </a:r>
+          </a:p>
+          <a:p>
+            <a:r>
+              <a:rPr lang="hu-HU" dirty="0"/>
+              <a:t>Valós idejű híráram és közösségi média</a:t>
+            </a:r>
+          </a:p>
+          <a:p>
+            <a:r>
+              <a:rPr lang="hu-HU" dirty="0"/>
+              <a:t>Élő ügyfélszolgálat chatbot</a:t>
+            </a:r>
+          </a:p>
+        </p:txBody>
+      </p:sp>
+      <p:sp>
+        <p:nvSpPr>
+          <p:cNvPr id="4" name="Dátum helye 3">
+            <a:extLst>
+              <a:ext uri="{FF2B5EF4-FFF2-40B4-BE49-F238E27FC236}">
+                <a16:creationId xmlns:a16="http://schemas.microsoft.com/office/drawing/2014/main" id="{72380C67-3C45-D763-3973-7ED6B3540198}"/>
+              </a:ext>
+            </a:extLst>
+          </p:cNvPr>
+          <p:cNvSpPr>
+            <a:spLocks noGrp="1"/>
+          </p:cNvSpPr>
+          <p:nvPr>
+            <p:ph type="dt" sz="half" idx="10"/>
+          </p:nvPr>
+        </p:nvSpPr>
+        <p:spPr/>
+        <p:txBody>
+          <a:bodyPr/>
+          <a:lstStyle/>
+          <a:p>
+            <a:endParaRPr lang="hu-HU" dirty="0"/>
+          </a:p>
+        </p:txBody>
+      </p:sp>
+    </p:spTree>
+    <p:extLst>
+      <p:ext uri="{BB962C8B-B14F-4D97-AF65-F5344CB8AC3E}">
+        <p14:creationId xmlns:p14="http://schemas.microsoft.com/office/powerpoint/2010/main" val="4241420566"/>
+      </p:ext>
+    </p:extLst>
+  </p:cSld>
+  <p:clrMapOvr>
+    <a:masterClrMapping/>
+  </p:clrMapOvr>
+</p:sld>
+</file>
+
+<file path=ppt/slides/slide28.xml><?xml version="1.0" encoding="utf-8"?>
+<p:sld xmlns:a="http://schemas.openxmlformats.org/drawingml/2006/main" xmlns:r="http://schemas.openxmlformats.org/officeDocument/2006/relationships" xmlns:p="http://schemas.openxmlformats.org/presentationml/2006/main">
+  <p:cSld>
+    <p:spTree>
+      <p:nvGrpSpPr>
+        <p:cNvPr id="1" name=""/>
+        <p:cNvGrpSpPr/>
+        <p:nvPr/>
+      </p:nvGrpSpPr>
+      <p:grpSpPr>
+        <a:xfrm>
+          <a:off x="0" y="0"/>
+          <a:ext cx="0" cy="0"/>
+          <a:chOff x="0" y="0"/>
+          <a:chExt cx="0" cy="0"/>
+        </a:xfrm>
+      </p:grpSpPr>
+      <p:sp>
+        <p:nvSpPr>
+          <p:cNvPr id="2" name="Cím 1">
+            <a:extLst>
+              <a:ext uri="{FF2B5EF4-FFF2-40B4-BE49-F238E27FC236}">
+                <a16:creationId xmlns:a16="http://schemas.microsoft.com/office/drawing/2014/main" id="{2B3D404A-3302-6578-2D67-2C24E0F733CF}"/>
+              </a:ext>
+            </a:extLst>
+          </p:cNvPr>
+          <p:cNvSpPr>
+            <a:spLocks noGrp="1"/>
+          </p:cNvSpPr>
+          <p:nvPr>
+            <p:ph type="title"/>
+          </p:nvPr>
+        </p:nvSpPr>
+        <p:spPr/>
+        <p:txBody>
+          <a:bodyPr/>
+          <a:lstStyle/>
+          <a:p>
+            <a:r>
+              <a:rPr lang="hu-HU" dirty="0"/>
+              <a:t>Kérdés 4/6</a:t>
+            </a:r>
+          </a:p>
+        </p:txBody>
+      </p:sp>
+      <p:sp>
+        <p:nvSpPr>
+          <p:cNvPr id="3" name="Tartalom helye 2">
+            <a:extLst>
+              <a:ext uri="{FF2B5EF4-FFF2-40B4-BE49-F238E27FC236}">
+                <a16:creationId xmlns:a16="http://schemas.microsoft.com/office/drawing/2014/main" id="{1420C507-EB27-3FCF-ED99-D04A0F081CBC}"/>
+              </a:ext>
+            </a:extLst>
+          </p:cNvPr>
+          <p:cNvSpPr>
+            <a:spLocks noGrp="1"/>
+          </p:cNvSpPr>
+          <p:nvPr>
+            <p:ph idx="1"/>
+          </p:nvPr>
+        </p:nvSpPr>
+        <p:spPr/>
+        <p:txBody>
+          <a:bodyPr>
+            <a:normAutofit fontScale="92500" lnSpcReduction="10000"/>
+          </a:bodyPr>
+          <a:lstStyle/>
+          <a:p>
+            <a:r>
+              <a:rPr lang="hu-HU" dirty="0"/>
+              <a:t>Hogyan kapcsolódik a bevezetett klaszter alapú, két lépcsős dokumentum keresés a FAISS könyvtárba tartozó IVF indexelési módszerhez?</a:t>
+            </a:r>
+          </a:p>
+          <a:p>
+            <a:endParaRPr lang="hu-HU" dirty="0"/>
+          </a:p>
+          <a:p>
+            <a:pPr marL="0" indent="0">
+              <a:buNone/>
+            </a:pPr>
+            <a:r>
+              <a:rPr lang="hu-HU" dirty="0"/>
+              <a:t>Válasz:</a:t>
+            </a:r>
+          </a:p>
+          <a:p>
+            <a:pPr marL="0" indent="0">
+              <a:buNone/>
+            </a:pPr>
+            <a:r>
+              <a:rPr lang="hu-HU" dirty="0"/>
+              <a:t>A kutatásom célja a dinamikus, streaming környezetek hatékony kezelése volt. FAISS IVF </a:t>
+            </a:r>
+            <a:r>
+              <a:rPr lang="hu-HU" dirty="0" err="1"/>
+              <a:t>KMeans</a:t>
+            </a:r>
+            <a:r>
+              <a:rPr lang="hu-HU" dirty="0"/>
+              <a:t> </a:t>
+            </a:r>
+            <a:r>
+              <a:rPr lang="hu-HU" dirty="0" err="1"/>
+              <a:t>klaszterezésen</a:t>
+            </a:r>
+            <a:r>
+              <a:rPr lang="hu-HU" dirty="0"/>
+              <a:t> alapszik, koncepcionálisan hasonlít az én módszeremre, de nem képes új klasztereket létrehozni, és meglévőket módosítani. Azért a HNSW alapú FAISS indexet választottam kiértékeléskor, mert képes gyorsan integrálni új adatokat, IVF-</a:t>
+            </a:r>
+            <a:r>
+              <a:rPr lang="hu-HU" dirty="0" err="1"/>
+              <a:t>nek</a:t>
+            </a:r>
+            <a:r>
+              <a:rPr lang="hu-HU" dirty="0"/>
+              <a:t> viszont újra kell futtatni a </a:t>
+            </a:r>
+            <a:r>
+              <a:rPr lang="hu-HU" dirty="0" err="1"/>
+              <a:t>klaszterezést</a:t>
+            </a:r>
+            <a:r>
+              <a:rPr lang="hu-HU" dirty="0"/>
+              <a:t>.</a:t>
+            </a:r>
+          </a:p>
+        </p:txBody>
+      </p:sp>
+      <p:sp>
+        <p:nvSpPr>
+          <p:cNvPr id="4" name="Dátum helye 3">
+            <a:extLst>
+              <a:ext uri="{FF2B5EF4-FFF2-40B4-BE49-F238E27FC236}">
+                <a16:creationId xmlns:a16="http://schemas.microsoft.com/office/drawing/2014/main" id="{36C9FEC2-180B-7E5C-D40A-C4B2BEC1B6C2}"/>
+              </a:ext>
+            </a:extLst>
+          </p:cNvPr>
+          <p:cNvSpPr>
+            <a:spLocks noGrp="1"/>
+          </p:cNvSpPr>
+          <p:nvPr>
+            <p:ph type="dt" sz="half" idx="10"/>
+          </p:nvPr>
+        </p:nvSpPr>
+        <p:spPr/>
+        <p:txBody>
+          <a:bodyPr/>
+          <a:lstStyle/>
+          <a:p>
+            <a:endParaRPr lang="hu-HU" dirty="0"/>
+          </a:p>
+        </p:txBody>
+      </p:sp>
+      <p:sp>
+        <p:nvSpPr>
+          <p:cNvPr id="5" name="Dia számának helye 4">
+            <a:extLst>
+              <a:ext uri="{FF2B5EF4-FFF2-40B4-BE49-F238E27FC236}">
+                <a16:creationId xmlns:a16="http://schemas.microsoft.com/office/drawing/2014/main" id="{4F5D90A3-581C-D439-01FA-2812B87D907E}"/>
+              </a:ext>
+            </a:extLst>
+          </p:cNvPr>
+          <p:cNvSpPr>
+            <a:spLocks noGrp="1"/>
+          </p:cNvSpPr>
+          <p:nvPr>
+            <p:ph type="sldNum" sz="quarter" idx="12"/>
+          </p:nvPr>
+        </p:nvSpPr>
+        <p:spPr/>
+        <p:txBody>
+          <a:bodyPr/>
+          <a:lstStyle/>
+          <a:p>
+            <a:endParaRPr lang="hu-HU" dirty="0"/>
+          </a:p>
+        </p:txBody>
+      </p:sp>
+    </p:spTree>
+    <p:extLst>
+      <p:ext uri="{BB962C8B-B14F-4D97-AF65-F5344CB8AC3E}">
+        <p14:creationId xmlns:p14="http://schemas.microsoft.com/office/powerpoint/2010/main" val="1218943555"/>
+      </p:ext>
+    </p:extLst>
+  </p:cSld>
+  <p:clrMapOvr>
+    <a:masterClrMapping/>
+  </p:clrMapOvr>
+</p:sld>
+</file>
+
+<file path=ppt/slides/slide29.xml><?xml version="1.0" encoding="utf-8"?>
+<p:sld xmlns:a="http://schemas.openxmlformats.org/drawingml/2006/main" xmlns:r="http://schemas.openxmlformats.org/officeDocument/2006/relationships" xmlns:p="http://schemas.openxmlformats.org/presentationml/2006/main">
+  <p:cSld>
+    <p:spTree>
+      <p:nvGrpSpPr>
+        <p:cNvPr id="1" name=""/>
+        <p:cNvGrpSpPr/>
+        <p:nvPr/>
+      </p:nvGrpSpPr>
+      <p:grpSpPr>
+        <a:xfrm>
+          <a:off x="0" y="0"/>
+          <a:ext cx="0" cy="0"/>
+          <a:chOff x="0" y="0"/>
+          <a:chExt cx="0" cy="0"/>
+        </a:xfrm>
+      </p:grpSpPr>
+      <p:sp>
+        <p:nvSpPr>
+          <p:cNvPr id="2" name="Cím 1">
+            <a:extLst>
+              <a:ext uri="{FF2B5EF4-FFF2-40B4-BE49-F238E27FC236}">
+                <a16:creationId xmlns:a16="http://schemas.microsoft.com/office/drawing/2014/main" id="{B4285C04-2A23-CDAF-E8BE-F6F82059DD88}"/>
+              </a:ext>
+            </a:extLst>
+          </p:cNvPr>
+          <p:cNvSpPr>
+            <a:spLocks noGrp="1"/>
+          </p:cNvSpPr>
+          <p:nvPr>
+            <p:ph type="title"/>
+          </p:nvPr>
+        </p:nvSpPr>
+        <p:spPr/>
+        <p:txBody>
+          <a:bodyPr/>
+          <a:lstStyle/>
+          <a:p>
+            <a:r>
+              <a:rPr lang="hu-HU" dirty="0"/>
+              <a:t>Kérdés 4/6</a:t>
+            </a:r>
+          </a:p>
+        </p:txBody>
+      </p:sp>
+      <p:pic>
+        <p:nvPicPr>
+          <p:cNvPr id="7" name="Tartalom helye 6" descr="A képen szöveg, képernyőkép, sor, Diagram látható&#10;&#10;Automatikusan generált leírás">
+            <a:extLst>
+              <a:ext uri="{FF2B5EF4-FFF2-40B4-BE49-F238E27FC236}">
+                <a16:creationId xmlns:a16="http://schemas.microsoft.com/office/drawing/2014/main" id="{C47E986C-89A4-AA07-57EC-312178B608B6}"/>
+              </a:ext>
+            </a:extLst>
+          </p:cNvPr>
+          <p:cNvPicPr>
+            <a:picLocks noGrp="1" noChangeAspect="1"/>
+          </p:cNvPicPr>
+          <p:nvPr>
+            <p:ph idx="1"/>
+          </p:nvPr>
+        </p:nvPicPr>
+        <p:blipFill>
+          <a:blip r:embed="rId2">
+            <a:extLst>
+              <a:ext uri="{28A0092B-C50C-407E-A947-70E740481C1C}">
+                <a14:useLocalDpi xmlns:a14="http://schemas.microsoft.com/office/drawing/2010/main" val="0"/>
+              </a:ext>
+            </a:extLst>
+          </a:blip>
+          <a:stretch>
+            <a:fillRect/>
+          </a:stretch>
+        </p:blipFill>
+        <p:spPr>
+          <a:xfrm>
+            <a:off x="944040" y="1346994"/>
+            <a:ext cx="10303920" cy="4683600"/>
+          </a:xfrm>
+        </p:spPr>
+      </p:pic>
+      <p:sp>
+        <p:nvSpPr>
+          <p:cNvPr id="4" name="Dátum helye 3">
+            <a:extLst>
+              <a:ext uri="{FF2B5EF4-FFF2-40B4-BE49-F238E27FC236}">
+                <a16:creationId xmlns:a16="http://schemas.microsoft.com/office/drawing/2014/main" id="{93FAC41A-DA4D-C2DB-7141-484654A0A980}"/>
+              </a:ext>
+            </a:extLst>
+          </p:cNvPr>
+          <p:cNvSpPr>
+            <a:spLocks noGrp="1"/>
+          </p:cNvSpPr>
+          <p:nvPr>
+            <p:ph type="dt" sz="half" idx="10"/>
+          </p:nvPr>
+        </p:nvSpPr>
+        <p:spPr/>
+        <p:txBody>
+          <a:bodyPr/>
+          <a:lstStyle/>
+          <a:p>
+            <a:endParaRPr lang="hu-HU" dirty="0"/>
+          </a:p>
+        </p:txBody>
+      </p:sp>
+      <p:sp>
+        <p:nvSpPr>
+          <p:cNvPr id="5" name="Dia számának helye 4">
+            <a:extLst>
+              <a:ext uri="{FF2B5EF4-FFF2-40B4-BE49-F238E27FC236}">
+                <a16:creationId xmlns:a16="http://schemas.microsoft.com/office/drawing/2014/main" id="{EB257049-C2C3-0F9B-1AD4-6A21ABA51A89}"/>
+              </a:ext>
+            </a:extLst>
+          </p:cNvPr>
+          <p:cNvSpPr>
+            <a:spLocks noGrp="1"/>
+          </p:cNvSpPr>
+          <p:nvPr>
+            <p:ph type="sldNum" sz="quarter" idx="12"/>
+          </p:nvPr>
+        </p:nvSpPr>
+        <p:spPr/>
+        <p:txBody>
+          <a:bodyPr/>
+          <a:lstStyle/>
+          <a:p>
+            <a:pPr marL="0" algn="l" defTabSz="914400" rtl="0" eaLnBrk="1" latinLnBrk="0" hangingPunct="1"/>
+            <a:endParaRPr lang="hu-HU" dirty="0"/>
+          </a:p>
+        </p:txBody>
+      </p:sp>
+    </p:spTree>
+    <p:extLst>
+      <p:ext uri="{BB962C8B-B14F-4D97-AF65-F5344CB8AC3E}">
+        <p14:creationId xmlns:p14="http://schemas.microsoft.com/office/powerpoint/2010/main" val="3399639706"/>
       </p:ext>
     </p:extLst>
   </p:cSld>
@@ -14458,7 +15264,7 @@
           <a:p>
             <a:fld id="{FB2979DB-241A-8544-95D6-5A5515E861C2}" type="datetime1">
               <a:rPr lang="hu-HU" smtClean="0"/>
-              <a:t>2025. 11. 15.</a:t>
+              <a:t>2025. 11. 16.</a:t>
             </a:fld>
             <a:endParaRPr lang="hu-HU"/>
           </a:p>
@@ -14536,6 +15342,1795 @@
     <p:extLst>
       <p:ext uri="{BB962C8B-B14F-4D97-AF65-F5344CB8AC3E}">
         <p14:creationId xmlns:p14="http://schemas.microsoft.com/office/powerpoint/2010/main" val="289319141"/>
+      </p:ext>
+    </p:extLst>
+  </p:cSld>
+  <p:clrMapOvr>
+    <a:masterClrMapping/>
+  </p:clrMapOvr>
+</p:sld>
+</file>
+
+<file path=ppt/slides/slide30.xml><?xml version="1.0" encoding="utf-8"?>
+<p:sld xmlns:a="http://schemas.openxmlformats.org/drawingml/2006/main" xmlns:r="http://schemas.openxmlformats.org/officeDocument/2006/relationships" xmlns:p="http://schemas.openxmlformats.org/presentationml/2006/main">
+  <p:cSld>
+    <p:spTree>
+      <p:nvGrpSpPr>
+        <p:cNvPr id="1" name=""/>
+        <p:cNvGrpSpPr/>
+        <p:nvPr/>
+      </p:nvGrpSpPr>
+      <p:grpSpPr>
+        <a:xfrm>
+          <a:off x="0" y="0"/>
+          <a:ext cx="0" cy="0"/>
+          <a:chOff x="0" y="0"/>
+          <a:chExt cx="0" cy="0"/>
+        </a:xfrm>
+      </p:grpSpPr>
+      <p:sp>
+        <p:nvSpPr>
+          <p:cNvPr id="2" name="Cím 1">
+            <a:extLst>
+              <a:ext uri="{FF2B5EF4-FFF2-40B4-BE49-F238E27FC236}">
+                <a16:creationId xmlns:a16="http://schemas.microsoft.com/office/drawing/2014/main" id="{9FBA52F7-CDAC-BDA6-EEE3-719E7EDD8478}"/>
+              </a:ext>
+            </a:extLst>
+          </p:cNvPr>
+          <p:cNvSpPr>
+            <a:spLocks noGrp="1"/>
+          </p:cNvSpPr>
+          <p:nvPr>
+            <p:ph type="title"/>
+          </p:nvPr>
+        </p:nvSpPr>
+        <p:spPr/>
+        <p:txBody>
+          <a:bodyPr/>
+          <a:lstStyle/>
+          <a:p>
+            <a:r>
+              <a:rPr lang="hu-HU" dirty="0"/>
+              <a:t>Kérdés 4/6</a:t>
+            </a:r>
+          </a:p>
+        </p:txBody>
+      </p:sp>
+      <p:pic>
+        <p:nvPicPr>
+          <p:cNvPr id="7" name="Tartalom helye 6" descr="A képen szöveg, sor, diagram, Diagram látható&#10;&#10;Automatikusan generált leírás">
+            <a:extLst>
+              <a:ext uri="{FF2B5EF4-FFF2-40B4-BE49-F238E27FC236}">
+                <a16:creationId xmlns:a16="http://schemas.microsoft.com/office/drawing/2014/main" id="{0F1A4F36-976E-E49E-DB82-3E1EA6D0BE89}"/>
+              </a:ext>
+            </a:extLst>
+          </p:cNvPr>
+          <p:cNvPicPr>
+            <a:picLocks noGrp="1" noChangeAspect="1"/>
+          </p:cNvPicPr>
+          <p:nvPr>
+            <p:ph idx="1"/>
+          </p:nvPr>
+        </p:nvPicPr>
+        <p:blipFill>
+          <a:blip r:embed="rId2">
+            <a:extLst>
+              <a:ext uri="{28A0092B-C50C-407E-A947-70E740481C1C}">
+                <a14:useLocalDpi xmlns:a14="http://schemas.microsoft.com/office/drawing/2010/main" val="0"/>
+              </a:ext>
+            </a:extLst>
+          </a:blip>
+          <a:stretch>
+            <a:fillRect/>
+          </a:stretch>
+        </p:blipFill>
+        <p:spPr>
+          <a:xfrm>
+            <a:off x="1880760" y="1414727"/>
+            <a:ext cx="8430480" cy="4683600"/>
+          </a:xfrm>
+        </p:spPr>
+      </p:pic>
+      <p:sp>
+        <p:nvSpPr>
+          <p:cNvPr id="4" name="Dátum helye 3">
+            <a:extLst>
+              <a:ext uri="{FF2B5EF4-FFF2-40B4-BE49-F238E27FC236}">
+                <a16:creationId xmlns:a16="http://schemas.microsoft.com/office/drawing/2014/main" id="{14BE750C-FD12-6CD7-3B11-DB3CDE6369CD}"/>
+              </a:ext>
+            </a:extLst>
+          </p:cNvPr>
+          <p:cNvSpPr>
+            <a:spLocks noGrp="1"/>
+          </p:cNvSpPr>
+          <p:nvPr>
+            <p:ph type="dt" sz="half" idx="10"/>
+          </p:nvPr>
+        </p:nvSpPr>
+        <p:spPr/>
+        <p:txBody>
+          <a:bodyPr/>
+          <a:lstStyle/>
+          <a:p>
+            <a:endParaRPr lang="hu-HU" dirty="0"/>
+          </a:p>
+        </p:txBody>
+      </p:sp>
+      <p:sp>
+        <p:nvSpPr>
+          <p:cNvPr id="5" name="Dia számának helye 4">
+            <a:extLst>
+              <a:ext uri="{FF2B5EF4-FFF2-40B4-BE49-F238E27FC236}">
+                <a16:creationId xmlns:a16="http://schemas.microsoft.com/office/drawing/2014/main" id="{98EDF101-52C1-5AE6-8A99-1719B118652E}"/>
+              </a:ext>
+            </a:extLst>
+          </p:cNvPr>
+          <p:cNvSpPr>
+            <a:spLocks noGrp="1"/>
+          </p:cNvSpPr>
+          <p:nvPr>
+            <p:ph type="sldNum" sz="quarter" idx="12"/>
+          </p:nvPr>
+        </p:nvSpPr>
+        <p:spPr/>
+        <p:txBody>
+          <a:bodyPr/>
+          <a:lstStyle/>
+          <a:p>
+            <a:pPr marL="0" algn="l" defTabSz="914400" rtl="0" eaLnBrk="1" latinLnBrk="0" hangingPunct="1"/>
+            <a:endParaRPr lang="hu-HU" dirty="0"/>
+          </a:p>
+        </p:txBody>
+      </p:sp>
+    </p:spTree>
+    <p:extLst>
+      <p:ext uri="{BB962C8B-B14F-4D97-AF65-F5344CB8AC3E}">
+        <p14:creationId xmlns:p14="http://schemas.microsoft.com/office/powerpoint/2010/main" val="3169858884"/>
+      </p:ext>
+    </p:extLst>
+  </p:cSld>
+  <p:clrMapOvr>
+    <a:masterClrMapping/>
+  </p:clrMapOvr>
+</p:sld>
+</file>
+
+<file path=ppt/slides/slide31.xml><?xml version="1.0" encoding="utf-8"?>
+<p:sld xmlns:a="http://schemas.openxmlformats.org/drawingml/2006/main" xmlns:r="http://schemas.openxmlformats.org/officeDocument/2006/relationships" xmlns:p="http://schemas.openxmlformats.org/presentationml/2006/main">
+  <p:cSld>
+    <p:spTree>
+      <p:nvGrpSpPr>
+        <p:cNvPr id="1" name=""/>
+        <p:cNvGrpSpPr/>
+        <p:nvPr/>
+      </p:nvGrpSpPr>
+      <p:grpSpPr>
+        <a:xfrm>
+          <a:off x="0" y="0"/>
+          <a:ext cx="0" cy="0"/>
+          <a:chOff x="0" y="0"/>
+          <a:chExt cx="0" cy="0"/>
+        </a:xfrm>
+      </p:grpSpPr>
+      <p:sp>
+        <p:nvSpPr>
+          <p:cNvPr id="2" name="Cím 1">
+            <a:extLst>
+              <a:ext uri="{FF2B5EF4-FFF2-40B4-BE49-F238E27FC236}">
+                <a16:creationId xmlns:a16="http://schemas.microsoft.com/office/drawing/2014/main" id="{50A6FD8F-0EC8-FA24-9871-53A30DCF9897}"/>
+              </a:ext>
+            </a:extLst>
+          </p:cNvPr>
+          <p:cNvSpPr>
+            <a:spLocks noGrp="1"/>
+          </p:cNvSpPr>
+          <p:nvPr>
+            <p:ph type="title"/>
+          </p:nvPr>
+        </p:nvSpPr>
+        <p:spPr/>
+        <p:txBody>
+          <a:bodyPr/>
+          <a:lstStyle/>
+          <a:p>
+            <a:r>
+              <a:rPr lang="hu-HU" dirty="0"/>
+              <a:t>Kérdés 5/6</a:t>
+            </a:r>
+          </a:p>
+        </p:txBody>
+      </p:sp>
+      <p:sp>
+        <p:nvSpPr>
+          <p:cNvPr id="3" name="Tartalom helye 2">
+            <a:extLst>
+              <a:ext uri="{FF2B5EF4-FFF2-40B4-BE49-F238E27FC236}">
+                <a16:creationId xmlns:a16="http://schemas.microsoft.com/office/drawing/2014/main" id="{339949F5-1AC9-199E-3E98-BD1808EDE719}"/>
+              </a:ext>
+            </a:extLst>
+          </p:cNvPr>
+          <p:cNvSpPr>
+            <a:spLocks noGrp="1"/>
+          </p:cNvSpPr>
+          <p:nvPr>
+            <p:ph idx="1"/>
+          </p:nvPr>
+        </p:nvSpPr>
+        <p:spPr/>
+        <p:txBody>
+          <a:bodyPr/>
+          <a:lstStyle/>
+          <a:p>
+            <a:r>
+              <a:rPr lang="hu-HU" dirty="0"/>
+              <a:t>Az Online </a:t>
+            </a:r>
+            <a:r>
+              <a:rPr lang="hu-HU" dirty="0" err="1"/>
+              <a:t>KMeans</a:t>
+            </a:r>
+            <a:r>
+              <a:rPr lang="hu-HU" dirty="0"/>
+              <a:t> algoritmus küszöbértékeket tartalmaz a klaszterek </a:t>
+            </a:r>
+            <a:r>
+              <a:rPr lang="hu-HU" dirty="0" err="1"/>
+              <a:t>összevonsára</a:t>
+            </a:r>
+            <a:r>
+              <a:rPr lang="hu-HU" dirty="0"/>
+              <a:t> és új klaszter </a:t>
+            </a:r>
+            <a:r>
+              <a:rPr lang="hu-HU" dirty="0" err="1"/>
+              <a:t>bevezetésésre</a:t>
+            </a:r>
+            <a:r>
+              <a:rPr lang="hu-HU" dirty="0"/>
+              <a:t>. Milyen módszerrel lettek ezek az értékek kiválasztva, és milyen hatása van a túl alacsony vagy túl magas értéknek a rendszer stabilitására?</a:t>
+            </a:r>
+          </a:p>
+          <a:p>
+            <a:endParaRPr lang="hu-HU" dirty="0"/>
+          </a:p>
+          <a:p>
+            <a:pPr marL="0" indent="0">
+              <a:buNone/>
+            </a:pPr>
+            <a:r>
+              <a:rPr lang="hu-HU" dirty="0"/>
+              <a:t>Válasz:</a:t>
+            </a:r>
+          </a:p>
+          <a:p>
+            <a:pPr marL="0" indent="0">
+              <a:buNone/>
+            </a:pPr>
+            <a:r>
+              <a:rPr lang="hu-HU" dirty="0"/>
+              <a:t>Az értékeket az adathalmaz megismerése során határoztam meg. Ezeknek az értékeknek a megválasztása kritikus, és mindenképpen a környezethez kell hangolni.</a:t>
+            </a:r>
+          </a:p>
+        </p:txBody>
+      </p:sp>
+      <p:sp>
+        <p:nvSpPr>
+          <p:cNvPr id="4" name="Dátum helye 3">
+            <a:extLst>
+              <a:ext uri="{FF2B5EF4-FFF2-40B4-BE49-F238E27FC236}">
+                <a16:creationId xmlns:a16="http://schemas.microsoft.com/office/drawing/2014/main" id="{47213920-9C0B-904B-7D21-4B7673C7448A}"/>
+              </a:ext>
+            </a:extLst>
+          </p:cNvPr>
+          <p:cNvSpPr>
+            <a:spLocks noGrp="1"/>
+          </p:cNvSpPr>
+          <p:nvPr>
+            <p:ph type="dt" sz="half" idx="10"/>
+          </p:nvPr>
+        </p:nvSpPr>
+        <p:spPr/>
+        <p:txBody>
+          <a:bodyPr/>
+          <a:lstStyle/>
+          <a:p>
+            <a:endParaRPr lang="hu-HU" dirty="0"/>
+          </a:p>
+        </p:txBody>
+      </p:sp>
+      <p:sp>
+        <p:nvSpPr>
+          <p:cNvPr id="5" name="Dia számának helye 4">
+            <a:extLst>
+              <a:ext uri="{FF2B5EF4-FFF2-40B4-BE49-F238E27FC236}">
+                <a16:creationId xmlns:a16="http://schemas.microsoft.com/office/drawing/2014/main" id="{A866DA96-D6F4-97A7-6DB9-E4B1BE207529}"/>
+              </a:ext>
+            </a:extLst>
+          </p:cNvPr>
+          <p:cNvSpPr>
+            <a:spLocks noGrp="1"/>
+          </p:cNvSpPr>
+          <p:nvPr>
+            <p:ph type="sldNum" sz="quarter" idx="12"/>
+          </p:nvPr>
+        </p:nvSpPr>
+        <p:spPr/>
+        <p:txBody>
+          <a:bodyPr/>
+          <a:lstStyle/>
+          <a:p>
+            <a:endParaRPr lang="hu-HU" dirty="0"/>
+          </a:p>
+        </p:txBody>
+      </p:sp>
+    </p:spTree>
+    <p:extLst>
+      <p:ext uri="{BB962C8B-B14F-4D97-AF65-F5344CB8AC3E}">
+        <p14:creationId xmlns:p14="http://schemas.microsoft.com/office/powerpoint/2010/main" val="1862809591"/>
+      </p:ext>
+    </p:extLst>
+  </p:cSld>
+  <p:clrMapOvr>
+    <a:masterClrMapping/>
+  </p:clrMapOvr>
+</p:sld>
+</file>
+
+<file path=ppt/slides/slide32.xml><?xml version="1.0" encoding="utf-8"?>
+<p:sld xmlns:a="http://schemas.openxmlformats.org/drawingml/2006/main" xmlns:r="http://schemas.openxmlformats.org/officeDocument/2006/relationships" xmlns:p="http://schemas.openxmlformats.org/presentationml/2006/main">
+  <p:cSld>
+    <p:spTree>
+      <p:nvGrpSpPr>
+        <p:cNvPr id="1" name=""/>
+        <p:cNvGrpSpPr/>
+        <p:nvPr/>
+      </p:nvGrpSpPr>
+      <p:grpSpPr>
+        <a:xfrm>
+          <a:off x="0" y="0"/>
+          <a:ext cx="0" cy="0"/>
+          <a:chOff x="0" y="0"/>
+          <a:chExt cx="0" cy="0"/>
+        </a:xfrm>
+      </p:grpSpPr>
+      <p:sp>
+        <p:nvSpPr>
+          <p:cNvPr id="2" name="Cím 1">
+            <a:extLst>
+              <a:ext uri="{FF2B5EF4-FFF2-40B4-BE49-F238E27FC236}">
+                <a16:creationId xmlns:a16="http://schemas.microsoft.com/office/drawing/2014/main" id="{91BAD43B-D426-7CBC-3AE6-E58FABDB8A36}"/>
+              </a:ext>
+            </a:extLst>
+          </p:cNvPr>
+          <p:cNvSpPr>
+            <a:spLocks noGrp="1"/>
+          </p:cNvSpPr>
+          <p:nvPr>
+            <p:ph type="title"/>
+          </p:nvPr>
+        </p:nvSpPr>
+        <p:spPr/>
+        <p:txBody>
+          <a:bodyPr/>
+          <a:lstStyle/>
+          <a:p>
+            <a:r>
+              <a:rPr lang="hu-HU" dirty="0"/>
+              <a:t>Kérdés 6/6</a:t>
+            </a:r>
+          </a:p>
+        </p:txBody>
+      </p:sp>
+      <p:sp>
+        <p:nvSpPr>
+          <p:cNvPr id="3" name="Tartalom helye 2">
+            <a:extLst>
+              <a:ext uri="{FF2B5EF4-FFF2-40B4-BE49-F238E27FC236}">
+                <a16:creationId xmlns:a16="http://schemas.microsoft.com/office/drawing/2014/main" id="{53D280D0-76BB-3A65-EB32-5B0854E10A51}"/>
+              </a:ext>
+            </a:extLst>
+          </p:cNvPr>
+          <p:cNvSpPr>
+            <a:spLocks noGrp="1"/>
+          </p:cNvSpPr>
+          <p:nvPr>
+            <p:ph idx="1"/>
+          </p:nvPr>
+        </p:nvSpPr>
+        <p:spPr/>
+        <p:txBody>
+          <a:bodyPr>
+            <a:normAutofit fontScale="92500" lnSpcReduction="10000"/>
+          </a:bodyPr>
+          <a:lstStyle/>
+          <a:p>
+            <a:r>
+              <a:rPr lang="hu-HU" dirty="0"/>
+              <a:t>Az Online </a:t>
+            </a:r>
+            <a:r>
+              <a:rPr lang="hu-HU" dirty="0" err="1"/>
+              <a:t>KMeans</a:t>
+            </a:r>
+            <a:r>
+              <a:rPr lang="hu-HU" dirty="0"/>
+              <a:t> algoritmus leírásában nem szerepel a klaszterösszevonási iteráció. Ez hogyan módosítaná az 1. táblázatban lévő időkomplexitási becslést?</a:t>
+            </a:r>
+          </a:p>
+          <a:p>
+            <a:endParaRPr lang="hu-HU" dirty="0"/>
+          </a:p>
+          <a:p>
+            <a:pPr marL="0" indent="0">
+              <a:buNone/>
+            </a:pPr>
+            <a:r>
+              <a:rPr lang="hu-HU" dirty="0"/>
+              <a:t>Válasz:</a:t>
+            </a:r>
+          </a:p>
+          <a:p>
+            <a:pPr marL="514350" indent="-514350">
+              <a:buFont typeface="+mj-lt"/>
+              <a:buAutoNum type="arabicPeriod"/>
+            </a:pPr>
+            <a:r>
+              <a:rPr lang="hu-HU" dirty="0"/>
+              <a:t>Távolságok számítása: </a:t>
+            </a:r>
+            <a:r>
+              <a:rPr lang="hu-HU" dirty="0" err="1"/>
+              <a:t>O</a:t>
+            </a:r>
+            <a:r>
+              <a:rPr lang="hu-HU" dirty="0"/>
+              <a:t>(</a:t>
+            </a:r>
+            <a:r>
+              <a:rPr lang="hu-HU" dirty="0" err="1"/>
+              <a:t>n⋅k⋅d</a:t>
+            </a:r>
+            <a:r>
+              <a:rPr lang="hu-HU" dirty="0"/>
+              <a:t>)</a:t>
+            </a:r>
+          </a:p>
+          <a:p>
+            <a:pPr marL="514350" indent="-514350">
+              <a:buFont typeface="+mj-lt"/>
+              <a:buAutoNum type="arabicPeriod"/>
+            </a:pPr>
+            <a:r>
+              <a:rPr lang="hu-HU" dirty="0"/>
+              <a:t>Min távolságok kiválasztása: </a:t>
+            </a:r>
+            <a:r>
+              <a:rPr lang="hu-HU" dirty="0" err="1"/>
+              <a:t>O</a:t>
+            </a:r>
+            <a:r>
+              <a:rPr lang="hu-HU" dirty="0"/>
+              <a:t>(</a:t>
+            </a:r>
+            <a:r>
+              <a:rPr lang="hu-HU" dirty="0" err="1"/>
+              <a:t>n⋅k</a:t>
+            </a:r>
+            <a:r>
+              <a:rPr lang="hu-HU" dirty="0"/>
+              <a:t>)</a:t>
+            </a:r>
+          </a:p>
+          <a:p>
+            <a:pPr marL="514350" indent="-514350">
+              <a:buFont typeface="+mj-lt"/>
+              <a:buAutoNum type="arabicPeriod"/>
+            </a:pPr>
+            <a:r>
+              <a:rPr lang="hu-HU" dirty="0"/>
+              <a:t>Új klaszterek létrehozása: </a:t>
+            </a:r>
+            <a:r>
+              <a:rPr lang="hu-HU" dirty="0" err="1"/>
+              <a:t>O</a:t>
+            </a:r>
+            <a:r>
+              <a:rPr lang="hu-HU" dirty="0"/>
+              <a:t>(</a:t>
+            </a:r>
+            <a:r>
+              <a:rPr lang="hu-HU" dirty="0" err="1"/>
+              <a:t>k⋅d</a:t>
+            </a:r>
+            <a:r>
+              <a:rPr lang="hu-HU" dirty="0"/>
+              <a:t>)</a:t>
+            </a:r>
+          </a:p>
+          <a:p>
+            <a:pPr marL="514350" indent="-514350">
+              <a:buFont typeface="+mj-lt"/>
+              <a:buAutoNum type="arabicPeriod"/>
+            </a:pPr>
+            <a:r>
+              <a:rPr lang="hu-HU" dirty="0" err="1"/>
+              <a:t>Centroid</a:t>
+            </a:r>
+            <a:r>
+              <a:rPr lang="hu-HU" dirty="0"/>
+              <a:t> frissítés: </a:t>
+            </a:r>
+            <a:r>
+              <a:rPr lang="hu-HU" dirty="0" err="1"/>
+              <a:t>O</a:t>
+            </a:r>
+            <a:r>
+              <a:rPr lang="hu-HU" dirty="0"/>
+              <a:t>(</a:t>
+            </a:r>
+            <a:r>
+              <a:rPr lang="hu-HU" dirty="0" err="1"/>
+              <a:t>n⋅d</a:t>
+            </a:r>
+            <a:r>
+              <a:rPr lang="hu-HU" dirty="0"/>
+              <a:t>)</a:t>
+            </a:r>
+          </a:p>
+          <a:p>
+            <a:pPr marL="514350" indent="-514350">
+              <a:buFont typeface="+mj-lt"/>
+              <a:buAutoNum type="arabicPeriod"/>
+            </a:pPr>
+            <a:r>
+              <a:rPr lang="hu-HU" dirty="0"/>
+              <a:t>Klaszterek összevonása: </a:t>
+            </a:r>
+            <a:r>
+              <a:rPr lang="hu-HU" dirty="0" err="1"/>
+              <a:t>O</a:t>
+            </a:r>
+            <a:r>
+              <a:rPr lang="hu-HU" dirty="0"/>
+              <a:t>(k</a:t>
+            </a:r>
+            <a:r>
+              <a:rPr lang="hu-HU" baseline="30000" dirty="0"/>
+              <a:t>2</a:t>
+            </a:r>
+            <a:r>
+              <a:rPr lang="hu-HU" dirty="0"/>
+              <a:t>⋅d)</a:t>
+            </a:r>
+          </a:p>
+        </p:txBody>
+      </p:sp>
+      <p:sp>
+        <p:nvSpPr>
+          <p:cNvPr id="4" name="Dátum helye 3">
+            <a:extLst>
+              <a:ext uri="{FF2B5EF4-FFF2-40B4-BE49-F238E27FC236}">
+                <a16:creationId xmlns:a16="http://schemas.microsoft.com/office/drawing/2014/main" id="{5A634973-1405-254B-EF4E-1981C252660E}"/>
+              </a:ext>
+            </a:extLst>
+          </p:cNvPr>
+          <p:cNvSpPr>
+            <a:spLocks noGrp="1"/>
+          </p:cNvSpPr>
+          <p:nvPr>
+            <p:ph type="dt" sz="half" idx="10"/>
+          </p:nvPr>
+        </p:nvSpPr>
+        <p:spPr/>
+        <p:txBody>
+          <a:bodyPr/>
+          <a:lstStyle/>
+          <a:p>
+            <a:endParaRPr lang="hu-HU" dirty="0"/>
+          </a:p>
+        </p:txBody>
+      </p:sp>
+      <p:sp>
+        <p:nvSpPr>
+          <p:cNvPr id="5" name="Dia számának helye 4">
+            <a:extLst>
+              <a:ext uri="{FF2B5EF4-FFF2-40B4-BE49-F238E27FC236}">
+                <a16:creationId xmlns:a16="http://schemas.microsoft.com/office/drawing/2014/main" id="{E8EEC99F-4BCD-8009-44A9-EB308AA1FE0A}"/>
+              </a:ext>
+            </a:extLst>
+          </p:cNvPr>
+          <p:cNvSpPr>
+            <a:spLocks noGrp="1"/>
+          </p:cNvSpPr>
+          <p:nvPr>
+            <p:ph type="sldNum" sz="quarter" idx="12"/>
+          </p:nvPr>
+        </p:nvSpPr>
+        <p:spPr/>
+        <p:txBody>
+          <a:bodyPr/>
+          <a:lstStyle/>
+          <a:p>
+            <a:endParaRPr lang="hu-HU" dirty="0"/>
+          </a:p>
+        </p:txBody>
+      </p:sp>
+      <p:sp>
+        <p:nvSpPr>
+          <p:cNvPr id="6" name="Jobb oldali szögletes zárójel 5">
+            <a:extLst>
+              <a:ext uri="{FF2B5EF4-FFF2-40B4-BE49-F238E27FC236}">
+                <a16:creationId xmlns:a16="http://schemas.microsoft.com/office/drawing/2014/main" id="{0111E78A-2683-DBB9-9E94-68F904F35B99}"/>
+              </a:ext>
+            </a:extLst>
+          </p:cNvPr>
+          <p:cNvSpPr/>
+          <p:nvPr/>
+        </p:nvSpPr>
+        <p:spPr>
+          <a:xfrm>
+            <a:off x="6282267" y="3802856"/>
+            <a:ext cx="677333" cy="1642534"/>
+          </a:xfrm>
+          <a:prstGeom prst="rightBracket">
+            <a:avLst/>
+          </a:prstGeom>
+          <a:ln w="38100"/>
+        </p:spPr>
+        <p:style>
+          <a:lnRef idx="2">
+            <a:schemeClr val="dk1"/>
+          </a:lnRef>
+          <a:fillRef idx="0">
+            <a:schemeClr val="dk1"/>
+          </a:fillRef>
+          <a:effectRef idx="1">
+            <a:schemeClr val="dk1"/>
+          </a:effectRef>
+          <a:fontRef idx="minor">
+            <a:schemeClr val="tx1"/>
+          </a:fontRef>
+        </p:style>
+        <p:txBody>
+          <a:bodyPr rtlCol="0" anchor="ctr"/>
+          <a:lstStyle/>
+          <a:p>
+            <a:pPr algn="ctr"/>
+            <a:endParaRPr lang="hu-HU"/>
+          </a:p>
+        </p:txBody>
+      </p:sp>
+      <p:cxnSp>
+        <p:nvCxnSpPr>
+          <p:cNvPr id="8" name="Egyenes összekötő nyíllal 7">
+            <a:extLst>
+              <a:ext uri="{FF2B5EF4-FFF2-40B4-BE49-F238E27FC236}">
+                <a16:creationId xmlns:a16="http://schemas.microsoft.com/office/drawing/2014/main" id="{8BB2EFC9-130C-6FF5-2D1E-5D2A892FAC5C}"/>
+              </a:ext>
+            </a:extLst>
+          </p:cNvPr>
+          <p:cNvCxnSpPr>
+            <a:cxnSpLocks/>
+          </p:cNvCxnSpPr>
+          <p:nvPr/>
+        </p:nvCxnSpPr>
+        <p:spPr>
+          <a:xfrm flipV="1">
+            <a:off x="6959600" y="4624122"/>
+            <a:ext cx="457200" cy="1"/>
+          </a:xfrm>
+          <a:prstGeom prst="straightConnector1">
+            <a:avLst/>
+          </a:prstGeom>
+          <a:ln w="38100">
+            <a:tailEnd type="triangle"/>
+          </a:ln>
+        </p:spPr>
+        <p:style>
+          <a:lnRef idx="2">
+            <a:schemeClr val="dk1"/>
+          </a:lnRef>
+          <a:fillRef idx="0">
+            <a:schemeClr val="dk1"/>
+          </a:fillRef>
+          <a:effectRef idx="1">
+            <a:schemeClr val="dk1"/>
+          </a:effectRef>
+          <a:fontRef idx="minor">
+            <a:schemeClr val="tx1"/>
+          </a:fontRef>
+        </p:style>
+      </p:cxnSp>
+      <p:cxnSp>
+        <p:nvCxnSpPr>
+          <p:cNvPr id="10" name="Egyenes összekötő nyíllal 9">
+            <a:extLst>
+              <a:ext uri="{FF2B5EF4-FFF2-40B4-BE49-F238E27FC236}">
+                <a16:creationId xmlns:a16="http://schemas.microsoft.com/office/drawing/2014/main" id="{FAFBA148-CF94-6825-68AF-99F756B8E2C2}"/>
+              </a:ext>
+            </a:extLst>
+          </p:cNvPr>
+          <p:cNvCxnSpPr>
+            <a:cxnSpLocks/>
+          </p:cNvCxnSpPr>
+          <p:nvPr/>
+        </p:nvCxnSpPr>
+        <p:spPr>
+          <a:xfrm>
+            <a:off x="6282267" y="5792523"/>
+            <a:ext cx="2243666" cy="0"/>
+          </a:xfrm>
+          <a:prstGeom prst="straightConnector1">
+            <a:avLst/>
+          </a:prstGeom>
+          <a:ln w="38100">
+            <a:tailEnd type="triangle"/>
+          </a:ln>
+        </p:spPr>
+        <p:style>
+          <a:lnRef idx="2">
+            <a:schemeClr val="dk1"/>
+          </a:lnRef>
+          <a:fillRef idx="0">
+            <a:schemeClr val="dk1"/>
+          </a:fillRef>
+          <a:effectRef idx="1">
+            <a:schemeClr val="dk1"/>
+          </a:effectRef>
+          <a:fontRef idx="minor">
+            <a:schemeClr val="tx1"/>
+          </a:fontRef>
+        </p:style>
+      </p:cxnSp>
+      <p:sp>
+        <p:nvSpPr>
+          <p:cNvPr id="12" name="Szövegdoboz 11">
+            <a:extLst>
+              <a:ext uri="{FF2B5EF4-FFF2-40B4-BE49-F238E27FC236}">
+                <a16:creationId xmlns:a16="http://schemas.microsoft.com/office/drawing/2014/main" id="{5EE71E48-DECC-1EA8-CD32-FB24377A3C23}"/>
+              </a:ext>
+            </a:extLst>
+          </p:cNvPr>
+          <p:cNvSpPr txBox="1"/>
+          <p:nvPr/>
+        </p:nvSpPr>
+        <p:spPr>
+          <a:xfrm>
+            <a:off x="7416800" y="4377900"/>
+            <a:ext cx="2218266" cy="492443"/>
+          </a:xfrm>
+          <a:prstGeom prst="rect">
+            <a:avLst/>
+          </a:prstGeom>
+          <a:noFill/>
+        </p:spPr>
+        <p:txBody>
+          <a:bodyPr wrap="square" rtlCol="0">
+            <a:spAutoFit/>
+          </a:bodyPr>
+          <a:lstStyle/>
+          <a:p>
+            <a:r>
+              <a:rPr lang="hu-HU" sz="2600" dirty="0" err="1"/>
+              <a:t>O</a:t>
+            </a:r>
+            <a:r>
+              <a:rPr lang="hu-HU" sz="2600" dirty="0"/>
+              <a:t>(</a:t>
+            </a:r>
+            <a:r>
+              <a:rPr lang="hu-HU" sz="2600" dirty="0" err="1"/>
+              <a:t>n⋅k⋅d</a:t>
+            </a:r>
+            <a:r>
+              <a:rPr lang="hu-HU" sz="2600" dirty="0"/>
+              <a:t>)</a:t>
+            </a:r>
+          </a:p>
+        </p:txBody>
+      </p:sp>
+      <p:sp>
+        <p:nvSpPr>
+          <p:cNvPr id="14" name="Jobb oldali szögletes zárójel 13">
+            <a:extLst>
+              <a:ext uri="{FF2B5EF4-FFF2-40B4-BE49-F238E27FC236}">
+                <a16:creationId xmlns:a16="http://schemas.microsoft.com/office/drawing/2014/main" id="{FF3730C2-03F2-3F39-4113-247653C9466B}"/>
+              </a:ext>
+            </a:extLst>
+          </p:cNvPr>
+          <p:cNvSpPr/>
+          <p:nvPr/>
+        </p:nvSpPr>
+        <p:spPr>
+          <a:xfrm>
+            <a:off x="8703735" y="4641054"/>
+            <a:ext cx="385233" cy="1098101"/>
+          </a:xfrm>
+          <a:prstGeom prst="rightBracket">
+            <a:avLst/>
+          </a:prstGeom>
+          <a:ln w="38100"/>
+        </p:spPr>
+        <p:style>
+          <a:lnRef idx="2">
+            <a:schemeClr val="dk1"/>
+          </a:lnRef>
+          <a:fillRef idx="0">
+            <a:schemeClr val="dk1"/>
+          </a:fillRef>
+          <a:effectRef idx="1">
+            <a:schemeClr val="dk1"/>
+          </a:effectRef>
+          <a:fontRef idx="minor">
+            <a:schemeClr val="tx1"/>
+          </a:fontRef>
+        </p:style>
+        <p:txBody>
+          <a:bodyPr rtlCol="0" anchor="ctr"/>
+          <a:lstStyle/>
+          <a:p>
+            <a:pPr algn="ctr"/>
+            <a:endParaRPr lang="hu-HU"/>
+          </a:p>
+        </p:txBody>
+      </p:sp>
+      <p:cxnSp>
+        <p:nvCxnSpPr>
+          <p:cNvPr id="15" name="Egyenes összekötő nyíllal 14">
+            <a:extLst>
+              <a:ext uri="{FF2B5EF4-FFF2-40B4-BE49-F238E27FC236}">
+                <a16:creationId xmlns:a16="http://schemas.microsoft.com/office/drawing/2014/main" id="{6B15900E-A6BD-C5EA-A3A1-C7A69C3E236C}"/>
+              </a:ext>
+            </a:extLst>
+          </p:cNvPr>
+          <p:cNvCxnSpPr>
+            <a:cxnSpLocks/>
+          </p:cNvCxnSpPr>
+          <p:nvPr/>
+        </p:nvCxnSpPr>
+        <p:spPr>
+          <a:xfrm>
+            <a:off x="9088968" y="5190104"/>
+            <a:ext cx="397933" cy="0"/>
+          </a:xfrm>
+          <a:prstGeom prst="straightConnector1">
+            <a:avLst/>
+          </a:prstGeom>
+          <a:ln w="38100">
+            <a:tailEnd type="triangle"/>
+          </a:ln>
+        </p:spPr>
+        <p:style>
+          <a:lnRef idx="2">
+            <a:schemeClr val="dk1"/>
+          </a:lnRef>
+          <a:fillRef idx="0">
+            <a:schemeClr val="dk1"/>
+          </a:fillRef>
+          <a:effectRef idx="1">
+            <a:schemeClr val="dk1"/>
+          </a:effectRef>
+          <a:fontRef idx="minor">
+            <a:schemeClr val="tx1"/>
+          </a:fontRef>
+        </p:style>
+      </p:cxnSp>
+      <mc:AlternateContent xmlns:mc="http://schemas.openxmlformats.org/markup-compatibility/2006" xmlns:a14="http://schemas.microsoft.com/office/drawing/2010/main">
+        <mc:Choice Requires="a14">
+          <p:sp>
+            <p:nvSpPr>
+              <p:cNvPr id="16" name="Szövegdoboz 15">
+                <a:extLst>
+                  <a:ext uri="{FF2B5EF4-FFF2-40B4-BE49-F238E27FC236}">
+                    <a16:creationId xmlns:a16="http://schemas.microsoft.com/office/drawing/2014/main" id="{7382F609-DC90-1DC6-FD7E-3F582CF5355F}"/>
+                  </a:ext>
+                </a:extLst>
+              </p:cNvPr>
+              <p:cNvSpPr txBox="1"/>
+              <p:nvPr/>
+            </p:nvSpPr>
+            <p:spPr>
+              <a:xfrm>
+                <a:off x="9520766" y="4953266"/>
+                <a:ext cx="2671233" cy="1692771"/>
+              </a:xfrm>
+              <a:prstGeom prst="rect">
+                <a:avLst/>
+              </a:prstGeom>
+              <a:noFill/>
+            </p:spPr>
+            <p:txBody>
+              <a:bodyPr wrap="square" rtlCol="0">
+                <a:spAutoFit/>
+              </a:bodyPr>
+              <a:lstStyle/>
+              <a:p>
+                <a:r>
+                  <a:rPr lang="hu-HU" sz="2600" dirty="0"/>
+                  <a:t>O(</a:t>
+                </a:r>
+                <a:r>
+                  <a:rPr lang="hu-HU" sz="2600" dirty="0" err="1"/>
+                  <a:t>n⋅k⋅d</a:t>
+                </a:r>
+                <a:r>
+                  <a:rPr lang="hu-HU" sz="2600" dirty="0"/>
+                  <a:t>) + </a:t>
+                </a:r>
+                <a:r>
+                  <a:rPr lang="hu-HU" sz="2600" dirty="0" err="1"/>
+                  <a:t>O</a:t>
+                </a:r>
+                <a:r>
+                  <a:rPr lang="hu-HU" sz="2600" dirty="0"/>
+                  <a:t>(k</a:t>
+                </a:r>
+                <a:r>
+                  <a:rPr lang="hu-HU" sz="2600" baseline="30000" dirty="0"/>
+                  <a:t>2</a:t>
+                </a:r>
+                <a:r>
+                  <a:rPr lang="hu-HU" sz="2600" dirty="0"/>
+                  <a:t>⋅d) </a:t>
+                </a:r>
+                <a14:m>
+                  <m:oMath xmlns:m="http://schemas.openxmlformats.org/officeDocument/2006/math">
+                    <m:r>
+                      <a:rPr lang="hu-HU" sz="2600" i="1" smtClean="0">
+                        <a:latin typeface="Cambria Math" panose="02040503050406030204" pitchFamily="18" charset="0"/>
+                        <a:ea typeface="Cambria Math" panose="02040503050406030204" pitchFamily="18" charset="0"/>
+                      </a:rPr>
+                      <m:t>≈</m:t>
+                    </m:r>
+                    <m:r>
+                      <m:rPr>
+                        <m:nor/>
+                      </m:rPr>
+                      <a:rPr lang="hu-HU" sz="2600" dirty="0"/>
+                      <m:t>O</m:t>
+                    </m:r>
+                    <m:r>
+                      <m:rPr>
+                        <m:nor/>
+                      </m:rPr>
+                      <a:rPr lang="hu-HU" sz="2600" dirty="0"/>
+                      <m:t>(</m:t>
+                    </m:r>
+                    <m:r>
+                      <m:rPr>
+                        <m:nor/>
+                      </m:rPr>
+                      <a:rPr lang="hu-HU" sz="2600" dirty="0"/>
+                      <m:t>n</m:t>
+                    </m:r>
+                    <m:r>
+                      <m:rPr>
+                        <m:nor/>
+                      </m:rPr>
+                      <a:rPr lang="hu-HU" sz="2600" dirty="0"/>
+                      <m:t>⋅</m:t>
+                    </m:r>
+                    <m:r>
+                      <m:rPr>
+                        <m:nor/>
+                      </m:rPr>
+                      <a:rPr lang="hu-HU" sz="2600" dirty="0"/>
+                      <m:t>k</m:t>
+                    </m:r>
+                    <m:r>
+                      <m:rPr>
+                        <m:nor/>
+                      </m:rPr>
+                      <a:rPr lang="hu-HU" sz="2600" dirty="0"/>
+                      <m:t>⋅</m:t>
+                    </m:r>
+                    <m:r>
+                      <m:rPr>
+                        <m:nor/>
+                      </m:rPr>
+                      <a:rPr lang="hu-HU" sz="2600" dirty="0"/>
+                      <m:t>d</m:t>
+                    </m:r>
+                    <m:r>
+                      <m:rPr>
+                        <m:nor/>
+                      </m:rPr>
+                      <a:rPr lang="hu-HU" sz="2600" dirty="0"/>
+                      <m:t>)</m:t>
+                    </m:r>
+                  </m:oMath>
+                </a14:m>
+                <a:endParaRPr lang="hu-HU" sz="2600" dirty="0"/>
+              </a:p>
+              <a:p>
+                <a:r>
+                  <a:rPr lang="hu-HU" sz="2600" dirty="0"/>
+                  <a:t>(amíg </a:t>
+                </a:r>
+                <a:r>
+                  <a:rPr lang="hu-HU" sz="2600" dirty="0" err="1"/>
+                  <a:t>k</a:t>
+                </a:r>
+                <a:r>
+                  <a:rPr lang="hu-HU" sz="2600" dirty="0"/>
+                  <a:t> &lt; </a:t>
+                </a:r>
+                <a:r>
+                  <a:rPr lang="hu-HU" sz="2600" dirty="0" err="1"/>
+                  <a:t>n</a:t>
+                </a:r>
+                <a:r>
+                  <a:rPr lang="hu-HU" sz="2600" dirty="0"/>
+                  <a:t>)</a:t>
+                </a:r>
+              </a:p>
+              <a:p>
+                <a:endParaRPr lang="hu-HU" sz="2600" dirty="0"/>
+              </a:p>
+            </p:txBody>
+          </p:sp>
+        </mc:Choice>
+        <mc:Fallback xmlns="">
+          <p:sp>
+            <p:nvSpPr>
+              <p:cNvPr id="16" name="Szövegdoboz 15">
+                <a:extLst>
+                  <a:ext uri="{FF2B5EF4-FFF2-40B4-BE49-F238E27FC236}">
+                    <a16:creationId xmlns:a16="http://schemas.microsoft.com/office/drawing/2014/main" id="{7382F609-DC90-1DC6-FD7E-3F582CF5355F}"/>
+                  </a:ext>
+                </a:extLst>
+              </p:cNvPr>
+              <p:cNvSpPr txBox="1">
+                <a:spLocks noRot="1" noChangeAspect="1" noMove="1" noResize="1" noEditPoints="1" noAdjustHandles="1" noChangeArrowheads="1" noChangeShapeType="1" noTextEdit="1"/>
+              </p:cNvSpPr>
+              <p:nvPr/>
+            </p:nvSpPr>
+            <p:spPr>
+              <a:xfrm>
+                <a:off x="9520766" y="4953266"/>
+                <a:ext cx="2671233" cy="1692771"/>
+              </a:xfrm>
+              <a:prstGeom prst="rect">
+                <a:avLst/>
+              </a:prstGeom>
+              <a:blipFill>
+                <a:blip r:embed="rId4"/>
+                <a:stretch>
+                  <a:fillRect l="-3774" t="-3731" r="-5189"/>
+                </a:stretch>
+              </a:blipFill>
+            </p:spPr>
+            <p:txBody>
+              <a:bodyPr/>
+              <a:lstStyle/>
+              <a:p>
+                <a:r>
+                  <a:rPr lang="hu-HU">
+                    <a:noFill/>
+                  </a:rPr>
+                  <a:t> </a:t>
+                </a:r>
+              </a:p>
+            </p:txBody>
+          </p:sp>
+        </mc:Fallback>
+      </mc:AlternateContent>
+    </p:spTree>
+    <p:extLst>
+      <p:ext uri="{BB962C8B-B14F-4D97-AF65-F5344CB8AC3E}">
+        <p14:creationId xmlns:p14="http://schemas.microsoft.com/office/powerpoint/2010/main" val="3886749342"/>
+      </p:ext>
+    </p:extLst>
+  </p:cSld>
+  <p:clrMapOvr>
+    <a:masterClrMapping/>
+  </p:clrMapOvr>
+</p:sld>
+</file>
+
+<file path=ppt/slides/slide33.xml><?xml version="1.0" encoding="utf-8"?>
+<p:sld xmlns:a="http://schemas.openxmlformats.org/drawingml/2006/main" xmlns:r="http://schemas.openxmlformats.org/officeDocument/2006/relationships" xmlns:p="http://schemas.openxmlformats.org/presentationml/2006/main">
+  <p:cSld>
+    <p:spTree>
+      <p:nvGrpSpPr>
+        <p:cNvPr id="1" name=""/>
+        <p:cNvGrpSpPr/>
+        <p:nvPr/>
+      </p:nvGrpSpPr>
+      <p:grpSpPr>
+        <a:xfrm>
+          <a:off x="0" y="0"/>
+          <a:ext cx="0" cy="0"/>
+          <a:chOff x="0" y="0"/>
+          <a:chExt cx="0" cy="0"/>
+        </a:xfrm>
+      </p:grpSpPr>
+      <p:sp>
+        <p:nvSpPr>
+          <p:cNvPr id="2" name="Cím 1">
+            <a:extLst>
+              <a:ext uri="{FF2B5EF4-FFF2-40B4-BE49-F238E27FC236}">
+                <a16:creationId xmlns:a16="http://schemas.microsoft.com/office/drawing/2014/main" id="{1B41110B-2A04-EA85-4FF0-EB63937E3AE8}"/>
+              </a:ext>
+            </a:extLst>
+          </p:cNvPr>
+          <p:cNvSpPr>
+            <a:spLocks noGrp="1"/>
+          </p:cNvSpPr>
+          <p:nvPr>
+            <p:ph type="title"/>
+          </p:nvPr>
+        </p:nvSpPr>
+        <p:spPr/>
+        <p:txBody>
+          <a:bodyPr/>
+          <a:lstStyle/>
+          <a:p>
+            <a:r>
+              <a:rPr lang="hu-HU" dirty="0"/>
+              <a:t>TODO</a:t>
+            </a:r>
+          </a:p>
+        </p:txBody>
+      </p:sp>
+      <p:sp>
+        <p:nvSpPr>
+          <p:cNvPr id="3" name="Tartalom helye 2">
+            <a:extLst>
+              <a:ext uri="{FF2B5EF4-FFF2-40B4-BE49-F238E27FC236}">
+                <a16:creationId xmlns:a16="http://schemas.microsoft.com/office/drawing/2014/main" id="{83012434-0F69-AAF1-CA47-2339956075A1}"/>
+              </a:ext>
+            </a:extLst>
+          </p:cNvPr>
+          <p:cNvSpPr>
+            <a:spLocks noGrp="1"/>
+          </p:cNvSpPr>
+          <p:nvPr>
+            <p:ph idx="1"/>
+          </p:nvPr>
+        </p:nvSpPr>
+        <p:spPr/>
+        <p:txBody>
+          <a:bodyPr/>
+          <a:lstStyle/>
+          <a:p>
+            <a:r>
+              <a:rPr lang="hu-HU" dirty="0"/>
+              <a:t>Online </a:t>
+            </a:r>
+            <a:r>
+              <a:rPr lang="hu-HU" dirty="0" err="1"/>
+              <a:t>clustering</a:t>
+            </a:r>
+            <a:r>
+              <a:rPr lang="hu-HU" dirty="0"/>
+              <a:t> ábra javítása</a:t>
+            </a:r>
+          </a:p>
+          <a:p>
+            <a:r>
+              <a:rPr lang="hu-HU" dirty="0"/>
+              <a:t>5,6,7 ábra egy klaszterszám mellett közös diagrammon</a:t>
+            </a:r>
+          </a:p>
+        </p:txBody>
+      </p:sp>
+      <p:sp>
+        <p:nvSpPr>
+          <p:cNvPr id="4" name="Dátum helye 3">
+            <a:extLst>
+              <a:ext uri="{FF2B5EF4-FFF2-40B4-BE49-F238E27FC236}">
+                <a16:creationId xmlns:a16="http://schemas.microsoft.com/office/drawing/2014/main" id="{71E60A27-C518-57F8-30B3-AC7DDDFF8654}"/>
+              </a:ext>
+            </a:extLst>
+          </p:cNvPr>
+          <p:cNvSpPr>
+            <a:spLocks noGrp="1"/>
+          </p:cNvSpPr>
+          <p:nvPr>
+            <p:ph type="dt" sz="half" idx="10"/>
+          </p:nvPr>
+        </p:nvSpPr>
+        <p:spPr/>
+        <p:txBody>
+          <a:bodyPr/>
+          <a:lstStyle/>
+          <a:p>
+            <a:fld id="{FB2979DB-241A-8544-95D6-5A5515E861C2}" type="datetime1">
+              <a:rPr lang="hu-HU" smtClean="0"/>
+              <a:t>2025. 11. 16.</a:t>
+            </a:fld>
+            <a:endParaRPr lang="hu-HU"/>
+          </a:p>
+        </p:txBody>
+      </p:sp>
+      <p:sp>
+        <p:nvSpPr>
+          <p:cNvPr id="5" name="Dia számának helye 4">
+            <a:extLst>
+              <a:ext uri="{FF2B5EF4-FFF2-40B4-BE49-F238E27FC236}">
+                <a16:creationId xmlns:a16="http://schemas.microsoft.com/office/drawing/2014/main" id="{510575B4-5356-8C7D-9C33-A3E9EC13C4A7}"/>
+              </a:ext>
+            </a:extLst>
+          </p:cNvPr>
+          <p:cNvSpPr>
+            <a:spLocks noGrp="1"/>
+          </p:cNvSpPr>
+          <p:nvPr>
+            <p:ph type="sldNum" sz="quarter" idx="12"/>
+          </p:nvPr>
+        </p:nvSpPr>
+        <p:spPr/>
+        <p:txBody>
+          <a:bodyPr/>
+          <a:lstStyle/>
+          <a:p>
+            <a:fld id="{61F88ADF-3301-4598-B089-C6A4CC92BE83}" type="slidenum">
+              <a:rPr lang="hu-HU" smtClean="0"/>
+              <a:t>33</a:t>
+            </a:fld>
+            <a:endParaRPr lang="hu-HU"/>
+          </a:p>
+        </p:txBody>
+      </p:sp>
+    </p:spTree>
+    <p:extLst>
+      <p:ext uri="{BB962C8B-B14F-4D97-AF65-F5344CB8AC3E}">
+        <p14:creationId xmlns:p14="http://schemas.microsoft.com/office/powerpoint/2010/main" val="1415883667"/>
+      </p:ext>
+    </p:extLst>
+  </p:cSld>
+  <p:clrMapOvr>
+    <a:masterClrMapping/>
+  </p:clrMapOvr>
+</p:sld>
+</file>
+
+<file path=ppt/slides/slide34.xml><?xml version="1.0" encoding="utf-8"?>
+<p:sld xmlns:a="http://schemas.openxmlformats.org/drawingml/2006/main" xmlns:r="http://schemas.openxmlformats.org/officeDocument/2006/relationships" xmlns:p="http://schemas.openxmlformats.org/presentationml/2006/main">
+  <p:cSld>
+    <p:spTree>
+      <p:nvGrpSpPr>
+        <p:cNvPr id="1" name=""/>
+        <p:cNvGrpSpPr/>
+        <p:nvPr/>
+      </p:nvGrpSpPr>
+      <p:grpSpPr>
+        <a:xfrm>
+          <a:off x="0" y="0"/>
+          <a:ext cx="0" cy="0"/>
+          <a:chOff x="0" y="0"/>
+          <a:chExt cx="0" cy="0"/>
+        </a:xfrm>
+      </p:grpSpPr>
+      <p:sp>
+        <p:nvSpPr>
+          <p:cNvPr id="2" name="Cím 1">
+            <a:extLst>
+              <a:ext uri="{FF2B5EF4-FFF2-40B4-BE49-F238E27FC236}">
+                <a16:creationId xmlns:a16="http://schemas.microsoft.com/office/drawing/2014/main" id="{02242FBB-2962-2D0C-F440-AE52FF32F22D}"/>
+              </a:ext>
+            </a:extLst>
+          </p:cNvPr>
+          <p:cNvSpPr>
+            <a:spLocks noGrp="1"/>
+          </p:cNvSpPr>
+          <p:nvPr>
+            <p:ph type="title"/>
+          </p:nvPr>
+        </p:nvSpPr>
+        <p:spPr/>
+        <p:txBody>
+          <a:bodyPr/>
+          <a:lstStyle/>
+          <a:p>
+            <a:r>
+              <a:rPr lang="hu-HU" dirty="0"/>
+              <a:t>Forrásjegyzék</a:t>
+            </a:r>
+          </a:p>
+        </p:txBody>
+      </p:sp>
+      <p:sp>
+        <p:nvSpPr>
+          <p:cNvPr id="3" name="Tartalom helye 2">
+            <a:extLst>
+              <a:ext uri="{FF2B5EF4-FFF2-40B4-BE49-F238E27FC236}">
+                <a16:creationId xmlns:a16="http://schemas.microsoft.com/office/drawing/2014/main" id="{448F6325-171C-9526-86E2-566A20E5EABC}"/>
+              </a:ext>
+            </a:extLst>
+          </p:cNvPr>
+          <p:cNvSpPr>
+            <a:spLocks noGrp="1"/>
+          </p:cNvSpPr>
+          <p:nvPr>
+            <p:ph idx="1"/>
+          </p:nvPr>
+        </p:nvSpPr>
+        <p:spPr/>
+        <p:txBody>
+          <a:bodyPr>
+            <a:normAutofit/>
+          </a:bodyPr>
+          <a:lstStyle/>
+          <a:p>
+            <a:r>
+              <a:rPr lang="hu-HU" sz="1800" dirty="0"/>
+              <a:t>[1] </a:t>
+            </a:r>
+            <a:r>
+              <a:rPr lang="hu-HU" sz="1800" dirty="0" err="1"/>
+              <a:t>Hariom</a:t>
+            </a:r>
+            <a:r>
+              <a:rPr lang="hu-HU" sz="1800" dirty="0"/>
+              <a:t> </a:t>
+            </a:r>
+            <a:r>
+              <a:rPr lang="hu-HU" sz="1800" dirty="0" err="1"/>
+              <a:t>Gautam</a:t>
+            </a:r>
+            <a:r>
+              <a:rPr lang="hu-HU" sz="1800" dirty="0"/>
+              <a:t>, (2020.03.01.), Word </a:t>
+            </a:r>
+            <a:r>
+              <a:rPr lang="hu-HU" sz="1800" dirty="0" err="1"/>
+              <a:t>Embedding</a:t>
+            </a:r>
+            <a:r>
+              <a:rPr lang="hu-HU" sz="1800" dirty="0"/>
+              <a:t>: </a:t>
+            </a:r>
+            <a:r>
+              <a:rPr lang="hu-HU" sz="1800" dirty="0" err="1"/>
+              <a:t>Basics</a:t>
+            </a:r>
+            <a:r>
+              <a:rPr lang="hu-HU" sz="1800" dirty="0"/>
+              <a:t>, </a:t>
+            </a:r>
+            <a:r>
+              <a:rPr lang="hu-HU" sz="1800" dirty="0" err="1"/>
+              <a:t>Medium</a:t>
+            </a:r>
+            <a:r>
+              <a:rPr lang="hu-HU" sz="1800" dirty="0"/>
+              <a:t>, </a:t>
+            </a:r>
+            <a:r>
+              <a:rPr lang="hu-HU" sz="1800" dirty="0">
+                <a:hlinkClick r:id="rId3"/>
+              </a:rPr>
+              <a:t>https://medium.com/@hari4om/word-embedding-d816f643140</a:t>
+            </a:r>
+            <a:endParaRPr lang="hu-HU" sz="1800" dirty="0"/>
+          </a:p>
+          <a:p>
+            <a:r>
+              <a:rPr lang="hu-HU" sz="1800" dirty="0"/>
+              <a:t>[2] </a:t>
+            </a:r>
+            <a:r>
+              <a:rPr lang="hu-HU" sz="1800" dirty="0" err="1"/>
+              <a:t>Varun</a:t>
+            </a:r>
+            <a:r>
+              <a:rPr lang="hu-HU" sz="1800" dirty="0"/>
+              <a:t>, (2020.09.27.), </a:t>
+            </a:r>
+            <a:r>
+              <a:rPr lang="hu-HU" sz="1800" dirty="0" err="1"/>
+              <a:t>Cosine</a:t>
+            </a:r>
+            <a:r>
+              <a:rPr lang="hu-HU" sz="1800" dirty="0"/>
+              <a:t> </a:t>
+            </a:r>
+            <a:r>
+              <a:rPr lang="hu-HU" sz="1800" dirty="0" err="1"/>
+              <a:t>similarity</a:t>
+            </a:r>
+            <a:r>
+              <a:rPr lang="hu-HU" sz="1800" dirty="0"/>
+              <a:t>: </a:t>
+            </a:r>
+            <a:r>
+              <a:rPr lang="hu-HU" sz="1800" dirty="0" err="1"/>
+              <a:t>How</a:t>
+            </a:r>
+            <a:r>
+              <a:rPr lang="hu-HU" sz="1800" dirty="0"/>
+              <a:t> </a:t>
+            </a:r>
+            <a:r>
+              <a:rPr lang="hu-HU" sz="1800" dirty="0" err="1"/>
+              <a:t>does</a:t>
+            </a:r>
+            <a:r>
+              <a:rPr lang="hu-HU" sz="1800" dirty="0"/>
+              <a:t> </a:t>
+            </a:r>
+            <a:r>
+              <a:rPr lang="hu-HU" sz="1800" dirty="0" err="1"/>
+              <a:t>it</a:t>
+            </a:r>
+            <a:r>
+              <a:rPr lang="hu-HU" sz="1800" dirty="0"/>
+              <a:t> </a:t>
+            </a:r>
+            <a:r>
+              <a:rPr lang="hu-HU" sz="1800" dirty="0" err="1"/>
+              <a:t>measure</a:t>
+            </a:r>
+            <a:r>
+              <a:rPr lang="hu-HU" sz="1800" dirty="0"/>
+              <a:t> </a:t>
+            </a:r>
+            <a:r>
+              <a:rPr lang="hu-HU" sz="1800" dirty="0" err="1"/>
+              <a:t>the</a:t>
+            </a:r>
+            <a:r>
+              <a:rPr lang="hu-HU" sz="1800" dirty="0"/>
+              <a:t> </a:t>
+            </a:r>
+            <a:r>
+              <a:rPr lang="hu-HU" sz="1800" dirty="0" err="1"/>
+              <a:t>similarity</a:t>
+            </a:r>
+            <a:r>
+              <a:rPr lang="hu-HU" sz="1800" dirty="0"/>
+              <a:t>, </a:t>
+            </a:r>
+            <a:r>
+              <a:rPr lang="hu-HU" sz="1800" dirty="0" err="1"/>
+              <a:t>Maths</a:t>
+            </a:r>
+            <a:r>
+              <a:rPr lang="hu-HU" sz="1800" dirty="0"/>
+              <a:t> </a:t>
+            </a:r>
+            <a:r>
+              <a:rPr lang="hu-HU" sz="1800" dirty="0" err="1"/>
+              <a:t>behind</a:t>
+            </a:r>
+            <a:r>
+              <a:rPr lang="hu-HU" sz="1800" dirty="0"/>
+              <a:t> and </a:t>
+            </a:r>
+            <a:r>
+              <a:rPr lang="hu-HU" sz="1800" dirty="0" err="1"/>
+              <a:t>usage</a:t>
+            </a:r>
+            <a:r>
+              <a:rPr lang="hu-HU" sz="1800" dirty="0"/>
+              <a:t> in Python, towardsdatascience.com ,</a:t>
+            </a:r>
+            <a:r>
+              <a:rPr lang="hu-HU" sz="1800" dirty="0">
+                <a:hlinkClick r:id="rId4"/>
+              </a:rPr>
+              <a:t>https://towardsdatascience.com/cosine-similarity-how-does-it-measure-the-similarity-maths-behind-and-usage-in-python-50ad30aad7db/</a:t>
+            </a:r>
+            <a:endParaRPr lang="hu-HU" sz="1800" dirty="0"/>
+          </a:p>
+          <a:p>
+            <a:r>
+              <a:rPr lang="hu-HU" sz="1800" dirty="0"/>
+              <a:t>[3] </a:t>
+            </a:r>
+            <a:r>
+              <a:rPr lang="hu-HU" sz="1800" dirty="0" err="1">
+                <a:solidFill>
+                  <a:srgbClr val="000000"/>
+                </a:solidFill>
+                <a:effectLst/>
+              </a:rPr>
+              <a:t>Pranav</a:t>
+            </a:r>
+            <a:r>
+              <a:rPr lang="hu-HU" sz="1800" dirty="0">
+                <a:solidFill>
+                  <a:srgbClr val="000000"/>
+                </a:solidFill>
+                <a:effectLst/>
+              </a:rPr>
+              <a:t> </a:t>
+            </a:r>
+            <a:r>
+              <a:rPr lang="hu-HU" sz="1800" dirty="0" err="1">
+                <a:solidFill>
+                  <a:srgbClr val="000000"/>
+                </a:solidFill>
+                <a:effectLst/>
+              </a:rPr>
+              <a:t>Rajpurkar</a:t>
+            </a:r>
+            <a:r>
+              <a:rPr lang="hu-HU" sz="1800" dirty="0">
+                <a:solidFill>
+                  <a:srgbClr val="000000"/>
+                </a:solidFill>
+                <a:effectLst/>
+              </a:rPr>
+              <a:t>, </a:t>
+            </a:r>
+            <a:r>
+              <a:rPr lang="hu-HU" sz="1800" dirty="0" err="1">
+                <a:solidFill>
+                  <a:srgbClr val="000000"/>
+                </a:solidFill>
+                <a:effectLst/>
+              </a:rPr>
+              <a:t>Jian</a:t>
+            </a:r>
+            <a:r>
+              <a:rPr lang="hu-HU" sz="1800" dirty="0">
+                <a:solidFill>
+                  <a:srgbClr val="000000"/>
+                </a:solidFill>
+                <a:effectLst/>
+              </a:rPr>
+              <a:t> </a:t>
+            </a:r>
+            <a:r>
+              <a:rPr lang="hu-HU" sz="1800" dirty="0" err="1">
+                <a:solidFill>
+                  <a:srgbClr val="000000"/>
+                </a:solidFill>
+                <a:effectLst/>
+              </a:rPr>
+              <a:t>Zhang</a:t>
+            </a:r>
+            <a:r>
+              <a:rPr lang="hu-HU" sz="1800" dirty="0">
+                <a:solidFill>
+                  <a:srgbClr val="000000"/>
+                </a:solidFill>
+                <a:effectLst/>
+              </a:rPr>
+              <a:t>, </a:t>
+            </a:r>
+            <a:r>
+              <a:rPr lang="hu-HU" sz="1800" dirty="0">
+                <a:effectLst/>
+              </a:rPr>
+              <a:t>Konstantin</a:t>
+            </a:r>
+            <a:r>
+              <a:rPr lang="hu-HU" sz="1800" dirty="0">
+                <a:solidFill>
+                  <a:srgbClr val="000000"/>
+                </a:solidFill>
+                <a:effectLst/>
+              </a:rPr>
+              <a:t> </a:t>
+            </a:r>
+            <a:r>
+              <a:rPr lang="hu-HU" sz="1800" dirty="0" err="1">
+                <a:solidFill>
+                  <a:srgbClr val="000000"/>
+                </a:solidFill>
+                <a:effectLst/>
+              </a:rPr>
+              <a:t>Lopyrev</a:t>
+            </a:r>
+            <a:r>
+              <a:rPr lang="hu-HU" sz="1800" dirty="0">
+                <a:solidFill>
+                  <a:srgbClr val="000000"/>
+                </a:solidFill>
+                <a:effectLst/>
+              </a:rPr>
+              <a:t>, Percy </a:t>
+            </a:r>
+            <a:r>
+              <a:rPr lang="hu-HU" sz="1800" dirty="0" err="1">
+                <a:solidFill>
+                  <a:srgbClr val="000000"/>
+                </a:solidFill>
+                <a:effectLst/>
+              </a:rPr>
+              <a:t>Liang</a:t>
+            </a:r>
+            <a:r>
+              <a:rPr lang="hu-HU" sz="1800" dirty="0">
+                <a:solidFill>
+                  <a:srgbClr val="000000"/>
+                </a:solidFill>
+                <a:effectLst/>
+              </a:rPr>
+              <a:t>, (2016.06.16.),</a:t>
+            </a:r>
+            <a:r>
+              <a:rPr lang="hu-HU" sz="1800" dirty="0" err="1">
+                <a:solidFill>
+                  <a:srgbClr val="000000"/>
+                </a:solidFill>
+                <a:effectLst/>
+              </a:rPr>
+              <a:t>SQuAD</a:t>
+            </a:r>
+            <a:r>
+              <a:rPr lang="hu-HU" sz="1800" dirty="0">
+                <a:solidFill>
+                  <a:srgbClr val="000000"/>
+                </a:solidFill>
+                <a:effectLst/>
+              </a:rPr>
+              <a:t>:</a:t>
+            </a:r>
+          </a:p>
+          <a:p>
+            <a:r>
+              <a:rPr lang="hu-HU" sz="1800" dirty="0">
+                <a:solidFill>
+                  <a:srgbClr val="000000"/>
+                </a:solidFill>
+                <a:effectLst/>
+              </a:rPr>
+              <a:t>100,000+ </a:t>
+            </a:r>
+            <a:r>
+              <a:rPr lang="hu-HU" sz="1800" dirty="0" err="1">
+                <a:solidFill>
+                  <a:srgbClr val="000000"/>
+                </a:solidFill>
+                <a:effectLst/>
+              </a:rPr>
+              <a:t>Questions</a:t>
+            </a:r>
+            <a:r>
+              <a:rPr lang="hu-HU" sz="1800" dirty="0">
+                <a:solidFill>
+                  <a:srgbClr val="000000"/>
+                </a:solidFill>
+                <a:effectLst/>
+              </a:rPr>
+              <a:t> </a:t>
+            </a:r>
+            <a:r>
+              <a:rPr lang="hu-HU" sz="1800" dirty="0" err="1">
+                <a:solidFill>
+                  <a:srgbClr val="000000"/>
+                </a:solidFill>
+                <a:effectLst/>
+              </a:rPr>
+              <a:t>for</a:t>
+            </a:r>
+            <a:r>
+              <a:rPr lang="hu-HU" sz="1800" dirty="0">
+                <a:solidFill>
+                  <a:srgbClr val="000000"/>
+                </a:solidFill>
+                <a:effectLst/>
+              </a:rPr>
+              <a:t> </a:t>
+            </a:r>
+            <a:r>
+              <a:rPr lang="hu-HU" sz="1800" dirty="0" err="1">
+                <a:solidFill>
+                  <a:srgbClr val="000000"/>
+                </a:solidFill>
+                <a:effectLst/>
+              </a:rPr>
+              <a:t>Machine</a:t>
+            </a:r>
+            <a:r>
+              <a:rPr lang="hu-HU" sz="1800" dirty="0">
+                <a:solidFill>
+                  <a:srgbClr val="000000"/>
+                </a:solidFill>
+                <a:effectLst/>
+              </a:rPr>
+              <a:t> </a:t>
+            </a:r>
+            <a:r>
+              <a:rPr lang="hu-HU" sz="1800" dirty="0" err="1">
+                <a:solidFill>
+                  <a:srgbClr val="000000"/>
+                </a:solidFill>
+                <a:effectLst/>
+              </a:rPr>
+              <a:t>Comprehension</a:t>
+            </a:r>
+            <a:r>
+              <a:rPr lang="hu-HU" sz="1800" dirty="0">
+                <a:solidFill>
+                  <a:srgbClr val="000000"/>
+                </a:solidFill>
+                <a:effectLst/>
+              </a:rPr>
+              <a:t> of Text, </a:t>
+            </a:r>
+            <a:r>
+              <a:rPr lang="hu-HU" sz="1800" dirty="0" err="1">
+                <a:solidFill>
+                  <a:srgbClr val="000000"/>
+                </a:solidFill>
+                <a:effectLst/>
+              </a:rPr>
+              <a:t>ArXiv</a:t>
+            </a:r>
+            <a:r>
+              <a:rPr lang="hu-HU" sz="1800" dirty="0">
+                <a:solidFill>
+                  <a:srgbClr val="000000"/>
+                </a:solidFill>
+                <a:effectLst/>
+              </a:rPr>
+              <a:t>, </a:t>
+            </a:r>
+            <a:r>
+              <a:rPr lang="hu-HU" sz="1800" b="0" i="0" u="sng" dirty="0">
+                <a:effectLst/>
+                <a:hlinkClick r:id="rId5"/>
+              </a:rPr>
+              <a:t>https://doi.org/10.48550/arXiv.1606.05250</a:t>
+            </a:r>
+            <a:endParaRPr lang="hu-HU" sz="1800" dirty="0"/>
+          </a:p>
+          <a:p>
+            <a:endParaRPr lang="hu-HU" sz="2000" dirty="0"/>
+          </a:p>
+        </p:txBody>
+      </p:sp>
+      <p:sp>
+        <p:nvSpPr>
+          <p:cNvPr id="4" name="Dátum helye 3">
+            <a:extLst>
+              <a:ext uri="{FF2B5EF4-FFF2-40B4-BE49-F238E27FC236}">
+                <a16:creationId xmlns:a16="http://schemas.microsoft.com/office/drawing/2014/main" id="{E3AFDC56-C173-DBE4-4AB5-B1829C2CB1E8}"/>
+              </a:ext>
+            </a:extLst>
+          </p:cNvPr>
+          <p:cNvSpPr>
+            <a:spLocks noGrp="1"/>
+          </p:cNvSpPr>
+          <p:nvPr>
+            <p:ph type="dt" sz="half" idx="10"/>
+          </p:nvPr>
+        </p:nvSpPr>
+        <p:spPr/>
+        <p:txBody>
+          <a:bodyPr/>
+          <a:lstStyle/>
+          <a:p>
+            <a:endParaRPr lang="hu-HU" dirty="0"/>
+          </a:p>
+        </p:txBody>
+      </p:sp>
+      <p:sp>
+        <p:nvSpPr>
+          <p:cNvPr id="5" name="Dia számának helye 4">
+            <a:extLst>
+              <a:ext uri="{FF2B5EF4-FFF2-40B4-BE49-F238E27FC236}">
+                <a16:creationId xmlns:a16="http://schemas.microsoft.com/office/drawing/2014/main" id="{68737DFA-5AEE-8E85-0BBC-53632C2E9510}"/>
+              </a:ext>
+            </a:extLst>
+          </p:cNvPr>
+          <p:cNvSpPr>
+            <a:spLocks noGrp="1"/>
+          </p:cNvSpPr>
+          <p:nvPr>
+            <p:ph type="sldNum" sz="quarter" idx="12"/>
+          </p:nvPr>
+        </p:nvSpPr>
+        <p:spPr/>
+        <p:txBody>
+          <a:bodyPr/>
+          <a:lstStyle/>
+          <a:p>
+            <a:pPr marL="0" algn="l" defTabSz="914400" rtl="0" eaLnBrk="1" latinLnBrk="0" hangingPunct="1"/>
+            <a:endParaRPr lang="hu-HU" dirty="0"/>
+          </a:p>
+        </p:txBody>
+      </p:sp>
+    </p:spTree>
+    <p:extLst>
+      <p:ext uri="{BB962C8B-B14F-4D97-AF65-F5344CB8AC3E}">
+        <p14:creationId xmlns:p14="http://schemas.microsoft.com/office/powerpoint/2010/main" val="2015096485"/>
       </p:ext>
     </p:extLst>
   </p:cSld>
@@ -15466,7 +18061,7 @@
           <a:p>
             <a:fld id="{9A3D4093-34E7-DB4F-8E21-29319E040103}" type="datetime1">
               <a:rPr lang="hu-HU" smtClean="0"/>
-              <a:t>2025. 11. 15.</a:t>
+              <a:t>2025. 11. 16.</a:t>
             </a:fld>
             <a:endParaRPr lang="hu-HU"/>
           </a:p>
@@ -16081,7 +18676,7 @@
           <a:p>
             <a:fld id="{EDCD7766-E8FF-F045-B46B-9108152DAA94}" type="datetime1">
               <a:rPr lang="hu-HU" smtClean="0"/>
-              <a:t>2025. 11. 15.</a:t>
+              <a:t>2025. 11. 16.</a:t>
             </a:fld>
             <a:endParaRPr lang="hu-HU"/>
           </a:p>
@@ -16301,7 +18896,7 @@
           <a:p>
             <a:fld id="{77E87468-36DB-7F46-920C-0F19CC9A9134}" type="datetime1">
               <a:rPr lang="hu-HU" smtClean="0"/>
-              <a:t>2025. 11. 15.</a:t>
+              <a:t>2025. 11. 16.</a:t>
             </a:fld>
             <a:endParaRPr lang="hu-HU"/>
           </a:p>
@@ -17353,7 +19948,7 @@
             </a:pPr>
             <a:fld id="{D24C2032-E76D-2848-BAF7-0E597B598D68}" type="datetime1">
               <a:rPr lang="hu-HU" smtClean="0"/>
-              <a:t>2025. 11. 15.</a:t>
+              <a:t>2025. 11. 16.</a:t>
             </a:fld>
             <a:endParaRPr lang="hu-HU"/>
           </a:p>
@@ -18001,7 +20596,7 @@
                   </a:schemeClr>
                 </a:solidFill>
               </a:rPr>
-              <a:t>2025. 11. 15.</a:t>
+              <a:t>2025. 11. 16.</a:t>
             </a:fld>
             <a:endParaRPr lang="en-US" dirty="0">
               <a:solidFill>
@@ -18700,7 +21295,7 @@
             </a:pPr>
             <a:fld id="{05B90B19-A1FC-5745-9E3E-9A58B2658B29}" type="datetime1">
               <a:rPr lang="hu-HU" smtClean="0"/>
-              <a:t>2025. 11. 15.</a:t>
+              <a:t>2025. 11. 16.</a:t>
             </a:fld>
             <a:endParaRPr lang="hu-HU"/>
           </a:p>

</xml_diff>